<commit_message>
Add final project PowerPoint presentation
</commit_message>
<xml_diff>
--- a/Projects For Final Exams/Final Project Report Advanced GIS-ML Based Crop Recommendation System for Sustainable.pptx
+++ b/Projects For Final Exams/Final Project Report Advanced GIS-ML Based Crop Recommendation System for Sustainable.pptx
@@ -28,9 +28,16 @@
     <p:sldId id="269" r:id="rId22"/>
     <p:sldId id="270" r:id="rId23"/>
     <p:sldId id="271" r:id="rId24"/>
-    <p:sldId id="272" r:id="rId25"/>
-    <p:sldId id="280" r:id="rId26"/>
-    <p:sldId id="273" r:id="rId27"/>
+    <p:sldId id="283" r:id="rId25"/>
+    <p:sldId id="272" r:id="rId26"/>
+    <p:sldId id="280" r:id="rId27"/>
+    <p:sldId id="284" r:id="rId28"/>
+    <p:sldId id="285" r:id="rId29"/>
+    <p:sldId id="286" r:id="rId30"/>
+    <p:sldId id="287" r:id="rId31"/>
+    <p:sldId id="288" r:id="rId32"/>
+    <p:sldId id="289" r:id="rId33"/>
+    <p:sldId id="273" r:id="rId34"/>
   </p:sldIdLst>
   <p:sldSz cx="12192000" cy="6858000"/>
   <p:notesSz cx="6858000" cy="9144000"/>
@@ -157,12 +164,22 @@
             <p14:sldId id="269"/>
             <p14:sldId id="270"/>
             <p14:sldId id="271"/>
+            <p14:sldId id="283"/>
             <p14:sldId id="272"/>
             <p14:sldId id="280"/>
+            <p14:sldId id="284"/>
+            <p14:sldId id="285"/>
+            <p14:sldId id="286"/>
+            <p14:sldId id="287"/>
+            <p14:sldId id="288"/>
+            <p14:sldId id="289"/>
             <p14:sldId id="273"/>
           </p14:sldIdLst>
         </p14:section>
       </p14:sectionLst>
+    </p:ext>
+    <p:ext uri="{EFAFB233-063F-42B5-8137-9DF3F51BA10A}">
+      <p15:sldGuideLst xmlns:p15="http://schemas.microsoft.com/office/powerpoint/2012/main"/>
     </p:ext>
   </p:extLst>
 </p:presentation>
@@ -499,7 +516,7 @@
           <a:p>
             <a:fld id="{9B2BBC14-37EB-4D50-BB1F-37D8CBD1B42F}" type="datetimeFigureOut">
               <a:rPr lang="en-CA" smtClean="0"/>
-              <a:t>2025-05-24</a:t>
+              <a:t>2025-05-28</a:t>
             </a:fld>
             <a:endParaRPr lang="en-CA"/>
           </a:p>
@@ -823,7 +840,7 @@
           <a:p>
             <a:fld id="{9B2BBC14-37EB-4D50-BB1F-37D8CBD1B42F}" type="datetimeFigureOut">
               <a:rPr lang="en-CA" smtClean="0"/>
-              <a:t>2025-05-24</a:t>
+              <a:t>2025-05-28</a:t>
             </a:fld>
             <a:endParaRPr lang="en-CA"/>
           </a:p>
@@ -1071,7 +1088,7 @@
           <a:p>
             <a:fld id="{9B2BBC14-37EB-4D50-BB1F-37D8CBD1B42F}" type="datetimeFigureOut">
               <a:rPr lang="en-CA" smtClean="0"/>
-              <a:t>2025-05-24</a:t>
+              <a:t>2025-05-28</a:t>
             </a:fld>
             <a:endParaRPr lang="en-CA"/>
           </a:p>
@@ -1410,7 +1427,7 @@
           <a:p>
             <a:fld id="{9B2BBC14-37EB-4D50-BB1F-37D8CBD1B42F}" type="datetimeFigureOut">
               <a:rPr lang="en-CA" smtClean="0"/>
-              <a:t>2025-05-24</a:t>
+              <a:t>2025-05-28</a:t>
             </a:fld>
             <a:endParaRPr lang="en-CA"/>
           </a:p>
@@ -1757,7 +1774,7 @@
           <a:p>
             <a:fld id="{9B2BBC14-37EB-4D50-BB1F-37D8CBD1B42F}" type="datetimeFigureOut">
               <a:rPr lang="en-CA" smtClean="0"/>
-              <a:t>2025-05-24</a:t>
+              <a:t>2025-05-28</a:t>
             </a:fld>
             <a:endParaRPr lang="en-CA"/>
           </a:p>
@@ -2131,7 +2148,7 @@
           <a:p>
             <a:fld id="{9B2BBC14-37EB-4D50-BB1F-37D8CBD1B42F}" type="datetimeFigureOut">
               <a:rPr lang="en-CA" smtClean="0"/>
-              <a:t>2025-05-24</a:t>
+              <a:t>2025-05-28</a:t>
             </a:fld>
             <a:endParaRPr lang="en-CA"/>
           </a:p>
@@ -2601,7 +2618,7 @@
           <a:p>
             <a:fld id="{9B2BBC14-37EB-4D50-BB1F-37D8CBD1B42F}" type="datetimeFigureOut">
               <a:rPr lang="en-CA" smtClean="0"/>
-              <a:t>2025-05-24</a:t>
+              <a:t>2025-05-28</a:t>
             </a:fld>
             <a:endParaRPr lang="en-CA"/>
           </a:p>
@@ -2806,7 +2823,7 @@
           <a:p>
             <a:fld id="{9B2BBC14-37EB-4D50-BB1F-37D8CBD1B42F}" type="datetimeFigureOut">
               <a:rPr lang="en-CA" smtClean="0"/>
-              <a:t>2025-05-24</a:t>
+              <a:t>2025-05-28</a:t>
             </a:fld>
             <a:endParaRPr lang="en-CA"/>
           </a:p>
@@ -3017,7 +3034,7 @@
           <a:p>
             <a:fld id="{9B2BBC14-37EB-4D50-BB1F-37D8CBD1B42F}" type="datetimeFigureOut">
               <a:rPr lang="en-CA" smtClean="0"/>
-              <a:t>2025-05-24</a:t>
+              <a:t>2025-05-28</a:t>
             </a:fld>
             <a:endParaRPr lang="en-CA"/>
           </a:p>
@@ -3249,7 +3266,7 @@
           <a:p>
             <a:fld id="{9B2BBC14-37EB-4D50-BB1F-37D8CBD1B42F}" type="datetimeFigureOut">
               <a:rPr lang="en-CA" smtClean="0"/>
-              <a:t>2025-05-24</a:t>
+              <a:t>2025-05-28</a:t>
             </a:fld>
             <a:endParaRPr lang="en-CA"/>
           </a:p>
@@ -3497,7 +3514,7 @@
           <a:p>
             <a:fld id="{9B2BBC14-37EB-4D50-BB1F-37D8CBD1B42F}" type="datetimeFigureOut">
               <a:rPr lang="en-CA" smtClean="0"/>
-              <a:t>2025-05-24</a:t>
+              <a:t>2025-05-28</a:t>
             </a:fld>
             <a:endParaRPr lang="en-CA"/>
           </a:p>
@@ -3795,7 +3812,7 @@
           <a:p>
             <a:fld id="{9B2BBC14-37EB-4D50-BB1F-37D8CBD1B42F}" type="datetimeFigureOut">
               <a:rPr lang="en-CA" smtClean="0"/>
-              <a:t>2025-05-24</a:t>
+              <a:t>2025-05-28</a:t>
             </a:fld>
             <a:endParaRPr lang="en-CA"/>
           </a:p>
@@ -4189,7 +4206,7 @@
           <a:p>
             <a:fld id="{9B2BBC14-37EB-4D50-BB1F-37D8CBD1B42F}" type="datetimeFigureOut">
               <a:rPr lang="en-CA" smtClean="0"/>
-              <a:t>2025-05-24</a:t>
+              <a:t>2025-05-28</a:t>
             </a:fld>
             <a:endParaRPr lang="en-CA"/>
           </a:p>
@@ -4338,7 +4355,7 @@
           <a:p>
             <a:fld id="{9B2BBC14-37EB-4D50-BB1F-37D8CBD1B42F}" type="datetimeFigureOut">
               <a:rPr lang="en-CA" smtClean="0"/>
-              <a:t>2025-05-24</a:t>
+              <a:t>2025-05-28</a:t>
             </a:fld>
             <a:endParaRPr lang="en-CA"/>
           </a:p>
@@ -4464,7 +4481,7 @@
           <a:p>
             <a:fld id="{9B2BBC14-37EB-4D50-BB1F-37D8CBD1B42F}" type="datetimeFigureOut">
               <a:rPr lang="en-CA" smtClean="0"/>
-              <a:t>2025-05-24</a:t>
+              <a:t>2025-05-28</a:t>
             </a:fld>
             <a:endParaRPr lang="en-CA"/>
           </a:p>
@@ -4719,7 +4736,7 @@
           <a:p>
             <a:fld id="{9B2BBC14-37EB-4D50-BB1F-37D8CBD1B42F}" type="datetimeFigureOut">
               <a:rPr lang="en-CA" smtClean="0"/>
-              <a:t>2025-05-24</a:t>
+              <a:t>2025-05-28</a:t>
             </a:fld>
             <a:endParaRPr lang="en-CA"/>
           </a:p>
@@ -5034,7 +5051,7 @@
           <a:p>
             <a:fld id="{9B2BBC14-37EB-4D50-BB1F-37D8CBD1B42F}" type="datetimeFigureOut">
               <a:rPr lang="en-CA" smtClean="0"/>
-              <a:t>2025-05-24</a:t>
+              <a:t>2025-05-28</a:t>
             </a:fld>
             <a:endParaRPr lang="en-CA"/>
           </a:p>
@@ -5385,7 +5402,7 @@
           <a:p>
             <a:fld id="{9B2BBC14-37EB-4D50-BB1F-37D8CBD1B42F}" type="datetimeFigureOut">
               <a:rPr lang="en-CA" smtClean="0"/>
-              <a:t>2025-05-24</a:t>
+              <a:t>2025-05-28</a:t>
             </a:fld>
             <a:endParaRPr lang="en-CA"/>
           </a:p>
@@ -9321,7 +9338,7 @@
           <p:cNvPr id="2" name="Başlık 1">
             <a:extLst>
               <a:ext uri="{FF2B5EF4-FFF2-40B4-BE49-F238E27FC236}">
-                <a16:creationId xmlns:a16="http://schemas.microsoft.com/office/drawing/2014/main" id="{B4334864-9A61-1C96-37F8-AB9A3AFB7D23}"/>
+                <a16:creationId xmlns:a16="http://schemas.microsoft.com/office/drawing/2014/main" id="{5A6EA900-4E24-C69C-4B2C-3DE4898F5FEB}"/>
               </a:ext>
             </a:extLst>
           </p:cNvPr>
@@ -9332,45 +9349,752 @@
             <p:ph type="title"/>
           </p:nvPr>
         </p:nvSpPr>
-        <p:spPr/>
+        <p:spPr>
+          <a:xfrm>
+            <a:off x="1295402" y="699620"/>
+            <a:ext cx="9601196" cy="1303867"/>
+          </a:xfrm>
+        </p:spPr>
         <p:txBody>
           <a:bodyPr/>
           <a:lstStyle/>
           <a:p>
             <a:r>
               <a:rPr lang="en-CA" dirty="0"/>
-              <a:t>9. Conclusion</a:t>
-            </a:r>
-          </a:p>
-        </p:txBody>
-      </p:sp>
-      <p:sp>
-        <p:nvSpPr>
-          <p:cNvPr id="3" name="İçerik Yer Tutucusu 2">
+              <a:t>📂 Project Repository &amp; Resources</a:t>
+            </a:r>
+          </a:p>
+        </p:txBody>
+      </p:sp>
+      <p:sp>
+        <p:nvSpPr>
+          <p:cNvPr id="4" name="Rectangle 1">
             <a:extLst>
               <a:ext uri="{FF2B5EF4-FFF2-40B4-BE49-F238E27FC236}">
-                <a16:creationId xmlns:a16="http://schemas.microsoft.com/office/drawing/2014/main" id="{F69CDEC6-5717-D043-5185-132230A035A6}"/>
+                <a16:creationId xmlns:a16="http://schemas.microsoft.com/office/drawing/2014/main" id="{A77E6D99-F632-189B-87B6-DBF245DC625D}"/>
               </a:ext>
             </a:extLst>
           </p:cNvPr>
           <p:cNvSpPr>
-            <a:spLocks noGrp="1"/>
+            <a:spLocks noGrp="1" noChangeArrowheads="1"/>
           </p:cNvSpPr>
           <p:nvPr>
             <p:ph idx="1"/>
           </p:nvPr>
         </p:nvSpPr>
-        <p:spPr/>
-        <p:txBody>
-          <a:bodyPr/>
+        <p:spPr bwMode="auto">
+          <a:xfrm>
+            <a:off x="1407426" y="1634065"/>
+            <a:ext cx="9377148" cy="4524315"/>
+          </a:xfrm>
+          <a:prstGeom prst="rect">
+            <a:avLst/>
+          </a:prstGeom>
+          <a:noFill/>
+          <a:ln>
+            <a:noFill/>
+          </a:ln>
+          <a:effectLst/>
+          <a:extLst>
+            <a:ext uri="{909E8E84-426E-40DD-AFC4-6F175D3DCCD1}">
+              <a14:hiddenFill xmlns:a14="http://schemas.microsoft.com/office/drawing/2010/main">
+                <a:solidFill>
+                  <a:schemeClr val="accent1"/>
+                </a:solidFill>
+              </a14:hiddenFill>
+            </a:ext>
+            <a:ext uri="{91240B29-F687-4F45-9708-019B960494DF}">
+              <a14:hiddenLine xmlns:a14="http://schemas.microsoft.com/office/drawing/2010/main" w="9525">
+                <a:solidFill>
+                  <a:schemeClr val="tx1"/>
+                </a:solidFill>
+                <a:miter lim="800000"/>
+                <a:headEnd/>
+                <a:tailEnd/>
+              </a14:hiddenLine>
+            </a:ext>
+            <a:ext uri="{AF507438-7753-43E0-B8FC-AC1667EBCBE1}">
+              <a14:hiddenEffects xmlns:a14="http://schemas.microsoft.com/office/drawing/2010/main">
+                <a:effectLst>
+                  <a:outerShdw dist="35921" dir="2700000" algn="ctr" rotWithShape="0">
+                    <a:schemeClr val="bg2"/>
+                  </a:outerShdw>
+                </a:effectLst>
+              </a14:hiddenEffects>
+            </a:ext>
+          </a:extLst>
+        </p:spPr>
+        <p:txBody>
+          <a:bodyPr vert="horz" wrap="square" lIns="91440" tIns="45720" rIns="91440" bIns="45720" numCol="1" anchor="ctr" anchorCtr="0" compatLnSpc="1">
+            <a:prstTxWarp prst="textNoShape">
+              <a:avLst/>
+            </a:prstTxWarp>
+            <a:spAutoFit/>
+          </a:bodyPr>
           <a:lstStyle/>
           <a:p>
-            <a:pPr marL="0" indent="0">
-              <a:buNone/>
+            <a:pPr marL="0" marR="0" lvl="0" indent="0" algn="l" defTabSz="914400" rtl="0" eaLnBrk="0" fontAlgn="base" latinLnBrk="0" hangingPunct="0">
+              <a:lnSpc>
+                <a:spcPct val="100000"/>
+              </a:lnSpc>
+              <a:spcBef>
+                <a:spcPct val="0"/>
+              </a:spcBef>
+              <a:spcAft>
+                <a:spcPct val="0"/>
+              </a:spcAft>
+              <a:buClrTx/>
+              <a:buSzTx/>
+              <a:buFontTx/>
+              <a:buNone/>
+              <a:tabLst/>
             </a:pPr>
             <a:r>
-              <a:rPr lang="en-CA" dirty="0"/>
-              <a:t>This project successfully developed a GIS-ML-based crop recommendation system for Antalya, Turkey. By utilizing spatial data and machine learning, the system can predict crop suitability and assist farmers in making informed decisions. The system's web interface provides an accessible tool for farmers to receive tailored recommendations, promoting more sustainable agricultural practices.</a:t>
+              <a:rPr kumimoji="0" lang="en-US" altLang="en-US" sz="1800" b="1" i="0" u="none" strike="noStrike" cap="none" normalizeH="0" baseline="0" dirty="0">
+                <a:ln>
+                  <a:noFill/>
+                </a:ln>
+                <a:solidFill>
+                  <a:schemeClr val="tx1"/>
+                </a:solidFill>
+                <a:effectLst/>
+              </a:rPr>
+              <a:t>Slide Content:</a:t>
+            </a:r>
+            <a:endParaRPr kumimoji="0" lang="en-US" altLang="en-US" sz="1800" b="0" i="0" u="none" strike="noStrike" cap="none" normalizeH="0" baseline="0" dirty="0">
+              <a:ln>
+                <a:noFill/>
+              </a:ln>
+              <a:solidFill>
+                <a:schemeClr val="tx1"/>
+              </a:solidFill>
+              <a:effectLst/>
+            </a:endParaRPr>
+          </a:p>
+          <a:p>
+            <a:pPr marL="0" marR="0" lvl="0" indent="0" algn="l" defTabSz="914400" rtl="0" eaLnBrk="0" fontAlgn="base" latinLnBrk="0" hangingPunct="0">
+              <a:lnSpc>
+                <a:spcPct val="100000"/>
+              </a:lnSpc>
+              <a:spcBef>
+                <a:spcPct val="0"/>
+              </a:spcBef>
+              <a:spcAft>
+                <a:spcPct val="0"/>
+              </a:spcAft>
+              <a:buClrTx/>
+              <a:buSzTx/>
+              <a:buFontTx/>
+              <a:buNone/>
+              <a:tabLst/>
+            </a:pPr>
+            <a:r>
+              <a:rPr kumimoji="0" lang="en-US" altLang="en-US" sz="1800" b="0" i="0" u="none" strike="noStrike" cap="none" normalizeH="0" baseline="0" dirty="0">
+                <a:ln>
+                  <a:noFill/>
+                </a:ln>
+                <a:solidFill>
+                  <a:schemeClr val="tx1"/>
+                </a:solidFill>
+                <a:effectLst/>
+              </a:rPr>
+              <a:t>🔗 </a:t>
+            </a:r>
+            <a:r>
+              <a:rPr kumimoji="0" lang="en-US" altLang="en-US" sz="1800" b="1" i="0" u="none" strike="noStrike" cap="none" normalizeH="0" baseline="0" dirty="0">
+                <a:ln>
+                  <a:noFill/>
+                </a:ln>
+                <a:solidFill>
+                  <a:schemeClr val="tx1"/>
+                </a:solidFill>
+                <a:effectLst/>
+              </a:rPr>
+              <a:t>GitHub Link</a:t>
+            </a:r>
+            <a:r>
+              <a:rPr kumimoji="0" lang="tr-TR" altLang="en-US" sz="1800" b="1" i="0" u="none" strike="noStrike" cap="none" normalizeH="0" baseline="0" dirty="0">
+                <a:ln>
+                  <a:noFill/>
+                </a:ln>
+                <a:solidFill>
+                  <a:schemeClr val="tx1"/>
+                </a:solidFill>
+                <a:effectLst/>
+              </a:rPr>
+              <a:t>:   </a:t>
+            </a:r>
+            <a:r>
+              <a:rPr kumimoji="0" lang="en-US" altLang="en-US" sz="1800" b="0" i="0" u="none" strike="noStrike" cap="none" normalizeH="0" baseline="0" dirty="0">
+                <a:ln>
+                  <a:noFill/>
+                </a:ln>
+                <a:solidFill>
+                  <a:schemeClr val="tx1"/>
+                </a:solidFill>
+                <a:effectLst/>
+                <a:hlinkClick r:id="rId2"/>
+              </a:rPr>
+              <a:t>https://github.com/abdramanemhtali/GIS_Projects-For-Final-Exams</a:t>
+            </a:r>
+            <a:endParaRPr kumimoji="0" lang="en-US" altLang="en-US" sz="1800" b="0" i="0" u="none" strike="noStrike" cap="none" normalizeH="0" baseline="0" dirty="0">
+              <a:ln>
+                <a:noFill/>
+              </a:ln>
+              <a:solidFill>
+                <a:schemeClr val="tx1"/>
+              </a:solidFill>
+              <a:effectLst/>
+            </a:endParaRPr>
+          </a:p>
+          <a:p>
+            <a:pPr marL="0" marR="0" lvl="0" indent="0" algn="l" defTabSz="914400" rtl="0" eaLnBrk="0" fontAlgn="base" latinLnBrk="0" hangingPunct="0">
+              <a:lnSpc>
+                <a:spcPct val="100000"/>
+              </a:lnSpc>
+              <a:spcBef>
+                <a:spcPct val="0"/>
+              </a:spcBef>
+              <a:spcAft>
+                <a:spcPct val="0"/>
+              </a:spcAft>
+              <a:buClrTx/>
+              <a:buSzTx/>
+              <a:buFontTx/>
+              <a:buNone/>
+              <a:tabLst/>
+            </a:pPr>
+            <a:endParaRPr kumimoji="0" lang="tr-TR" altLang="en-US" sz="1800" b="0" i="0" u="none" strike="noStrike" cap="none" normalizeH="0" baseline="0" dirty="0">
+              <a:ln>
+                <a:noFill/>
+              </a:ln>
+              <a:solidFill>
+                <a:schemeClr val="tx1"/>
+              </a:solidFill>
+              <a:effectLst/>
+            </a:endParaRPr>
+          </a:p>
+          <a:p>
+            <a:pPr marL="0" marR="0" lvl="0" indent="0" algn="l" defTabSz="914400" rtl="0" eaLnBrk="0" fontAlgn="base" latinLnBrk="0" hangingPunct="0">
+              <a:lnSpc>
+                <a:spcPct val="100000"/>
+              </a:lnSpc>
+              <a:spcBef>
+                <a:spcPct val="0"/>
+              </a:spcBef>
+              <a:spcAft>
+                <a:spcPct val="0"/>
+              </a:spcAft>
+              <a:buClrTx/>
+              <a:buSzTx/>
+              <a:buFontTx/>
+              <a:buNone/>
+              <a:tabLst/>
+            </a:pPr>
+            <a:r>
+              <a:rPr kumimoji="0" lang="en-US" altLang="en-US" sz="1800" b="0" i="0" u="none" strike="noStrike" cap="none" normalizeH="0" baseline="0" dirty="0">
+                <a:ln>
+                  <a:noFill/>
+                </a:ln>
+                <a:solidFill>
+                  <a:schemeClr val="tx1"/>
+                </a:solidFill>
+                <a:effectLst/>
+              </a:rPr>
+              <a:t>📝 </a:t>
+            </a:r>
+            <a:r>
+              <a:rPr kumimoji="0" lang="en-US" altLang="en-US" sz="1800" b="1" i="0" u="none" strike="noStrike" cap="none" normalizeH="0" baseline="0" dirty="0">
+                <a:ln>
+                  <a:noFill/>
+                </a:ln>
+                <a:solidFill>
+                  <a:schemeClr val="tx1"/>
+                </a:solidFill>
+                <a:effectLst/>
+              </a:rPr>
+              <a:t>About the Repository</a:t>
+            </a:r>
+            <a:endParaRPr kumimoji="0" lang="tr-TR" altLang="en-US" sz="1800" b="1" i="0" u="none" strike="noStrike" cap="none" normalizeH="0" baseline="0" dirty="0">
+              <a:ln>
+                <a:noFill/>
+              </a:ln>
+              <a:solidFill>
+                <a:schemeClr val="tx1"/>
+              </a:solidFill>
+              <a:effectLst/>
+            </a:endParaRPr>
+          </a:p>
+          <a:p>
+            <a:pPr marL="0" marR="0" lvl="0" indent="0" algn="l" defTabSz="914400" rtl="0" eaLnBrk="0" fontAlgn="base" latinLnBrk="0" hangingPunct="0">
+              <a:lnSpc>
+                <a:spcPct val="100000"/>
+              </a:lnSpc>
+              <a:spcBef>
+                <a:spcPct val="0"/>
+              </a:spcBef>
+              <a:spcAft>
+                <a:spcPct val="0"/>
+              </a:spcAft>
+              <a:buClrTx/>
+              <a:buSzTx/>
+              <a:buFontTx/>
+              <a:buNone/>
+              <a:tabLst/>
+            </a:pPr>
+            <a:br>
+              <a:rPr kumimoji="0" lang="en-US" altLang="en-US" sz="1800" b="0" i="0" u="none" strike="noStrike" cap="none" normalizeH="0" baseline="0" dirty="0">
+                <a:ln>
+                  <a:noFill/>
+                </a:ln>
+                <a:solidFill>
+                  <a:schemeClr val="tx1"/>
+                </a:solidFill>
+                <a:effectLst/>
+              </a:rPr>
+            </a:br>
+            <a:r>
+              <a:rPr kumimoji="0" lang="en-US" altLang="en-US" sz="1800" b="0" i="0" u="none" strike="noStrike" cap="none" normalizeH="0" baseline="0" dirty="0">
+                <a:ln>
+                  <a:noFill/>
+                </a:ln>
+                <a:solidFill>
+                  <a:schemeClr val="tx1"/>
+                </a:solidFill>
+                <a:effectLst/>
+              </a:rPr>
+              <a:t>This GitHub repository contains all core deliverables of the final project:</a:t>
+            </a:r>
+          </a:p>
+          <a:p>
+            <a:pPr marR="0" lvl="0" algn="l" defTabSz="914400" rtl="0" eaLnBrk="0" fontAlgn="base" latinLnBrk="0" hangingPunct="0">
+              <a:lnSpc>
+                <a:spcPct val="100000"/>
+              </a:lnSpc>
+              <a:spcBef>
+                <a:spcPct val="0"/>
+              </a:spcBef>
+              <a:spcAft>
+                <a:spcPct val="0"/>
+              </a:spcAft>
+              <a:buClrTx/>
+              <a:buSzTx/>
+              <a:buFont typeface="Wingdings" panose="05000000000000000000" pitchFamily="2" charset="2"/>
+              <a:buChar char="Ø"/>
+              <a:tabLst/>
+            </a:pPr>
+            <a:r>
+              <a:rPr kumimoji="0" lang="en-US" altLang="en-US" sz="1800" b="0" i="0" u="none" strike="noStrike" cap="none" normalizeH="0" baseline="0" dirty="0">
+                <a:ln>
+                  <a:noFill/>
+                </a:ln>
+                <a:solidFill>
+                  <a:schemeClr val="tx1"/>
+                </a:solidFill>
+                <a:effectLst/>
+              </a:rPr>
+              <a:t>A comprehensive project report</a:t>
+            </a:r>
+          </a:p>
+          <a:p>
+            <a:pPr marR="0" lvl="0" algn="l" defTabSz="914400" rtl="0" eaLnBrk="0" fontAlgn="base" latinLnBrk="0" hangingPunct="0">
+              <a:lnSpc>
+                <a:spcPct val="100000"/>
+              </a:lnSpc>
+              <a:spcBef>
+                <a:spcPct val="0"/>
+              </a:spcBef>
+              <a:spcAft>
+                <a:spcPct val="0"/>
+              </a:spcAft>
+              <a:buClrTx/>
+              <a:buSzTx/>
+              <a:buFont typeface="Wingdings" panose="05000000000000000000" pitchFamily="2" charset="2"/>
+              <a:buChar char="Ø"/>
+              <a:tabLst/>
+            </a:pPr>
+            <a:r>
+              <a:rPr kumimoji="0" lang="en-US" altLang="en-US" sz="1800" b="0" i="0" u="none" strike="noStrike" cap="none" normalizeH="0" baseline="0" dirty="0">
+                <a:ln>
+                  <a:noFill/>
+                </a:ln>
+                <a:solidFill>
+                  <a:schemeClr val="tx1"/>
+                </a:solidFill>
+                <a:effectLst/>
+              </a:rPr>
+              <a:t>Machine learning model code (</a:t>
+            </a:r>
+            <a:r>
+              <a:rPr kumimoji="0" lang="en-US" altLang="en-US" sz="1800" b="0" i="0" u="none" strike="noStrike" cap="none" normalizeH="0" baseline="0" dirty="0" err="1">
+                <a:ln>
+                  <a:noFill/>
+                </a:ln>
+                <a:solidFill>
+                  <a:schemeClr val="tx1"/>
+                </a:solidFill>
+                <a:effectLst/>
+              </a:rPr>
+              <a:t>Colab</a:t>
+            </a:r>
+            <a:r>
+              <a:rPr kumimoji="0" lang="en-US" altLang="en-US" sz="1800" b="0" i="0" u="none" strike="noStrike" cap="none" normalizeH="0" baseline="0" dirty="0">
+                <a:ln>
+                  <a:noFill/>
+                </a:ln>
+                <a:solidFill>
+                  <a:schemeClr val="tx1"/>
+                </a:solidFill>
+                <a:effectLst/>
+              </a:rPr>
+              <a:t> + Flask/</a:t>
+            </a:r>
+            <a:r>
+              <a:rPr kumimoji="0" lang="en-US" altLang="en-US" sz="1800" b="0" i="0" u="none" strike="noStrike" cap="none" normalizeH="0" baseline="0" dirty="0" err="1">
+                <a:ln>
+                  <a:noFill/>
+                </a:ln>
+                <a:solidFill>
+                  <a:schemeClr val="tx1"/>
+                </a:solidFill>
+                <a:effectLst/>
+              </a:rPr>
+              <a:t>Streamlit</a:t>
+            </a:r>
+            <a:r>
+              <a:rPr kumimoji="0" lang="en-US" altLang="en-US" sz="1800" b="0" i="0" u="none" strike="noStrike" cap="none" normalizeH="0" baseline="0" dirty="0">
+                <a:ln>
+                  <a:noFill/>
+                </a:ln>
+                <a:solidFill>
+                  <a:schemeClr val="tx1"/>
+                </a:solidFill>
+                <a:effectLst/>
+              </a:rPr>
+              <a:t>)</a:t>
+            </a:r>
+          </a:p>
+          <a:p>
+            <a:pPr marR="0" lvl="0" algn="l" defTabSz="914400" rtl="0" eaLnBrk="0" fontAlgn="base" latinLnBrk="0" hangingPunct="0">
+              <a:lnSpc>
+                <a:spcPct val="100000"/>
+              </a:lnSpc>
+              <a:spcBef>
+                <a:spcPct val="0"/>
+              </a:spcBef>
+              <a:spcAft>
+                <a:spcPct val="0"/>
+              </a:spcAft>
+              <a:buClrTx/>
+              <a:buSzTx/>
+              <a:buFont typeface="Wingdings" panose="05000000000000000000" pitchFamily="2" charset="2"/>
+              <a:buChar char="Ø"/>
+              <a:tabLst/>
+            </a:pPr>
+            <a:r>
+              <a:rPr kumimoji="0" lang="en-US" altLang="en-US" sz="1800" b="0" i="0" u="none" strike="noStrike" cap="none" normalizeH="0" baseline="0" dirty="0">
+                <a:ln>
+                  <a:noFill/>
+                </a:ln>
+                <a:solidFill>
+                  <a:schemeClr val="tx1"/>
+                </a:solidFill>
+                <a:effectLst/>
+              </a:rPr>
+              <a:t>Input datasets including raster </a:t>
+            </a:r>
+            <a:r>
+              <a:rPr kumimoji="0" lang="en-US" altLang="en-US" sz="1000" b="0" i="0" u="none" strike="noStrike" cap="none" normalizeH="0" baseline="0" dirty="0">
+                <a:ln>
+                  <a:noFill/>
+                </a:ln>
+                <a:solidFill>
+                  <a:schemeClr val="tx1"/>
+                </a:solidFill>
+                <a:effectLst/>
+              </a:rPr>
+              <a:t>.</a:t>
+            </a:r>
+            <a:r>
+              <a:rPr kumimoji="0" lang="en-US" altLang="en-US" sz="1000" b="0" i="0" u="none" strike="noStrike" cap="none" normalizeH="0" baseline="0" dirty="0" err="1">
+                <a:ln>
+                  <a:noFill/>
+                </a:ln>
+                <a:solidFill>
+                  <a:schemeClr val="tx1"/>
+                </a:solidFill>
+                <a:effectLst/>
+              </a:rPr>
+              <a:t>tif</a:t>
+            </a:r>
+            <a:r>
+              <a:rPr kumimoji="0" lang="en-US" altLang="en-US" sz="1100" b="0" i="0" u="none" strike="noStrike" cap="none" normalizeH="0" baseline="0" dirty="0">
+                <a:ln>
+                  <a:noFill/>
+                </a:ln>
+                <a:solidFill>
+                  <a:schemeClr val="tx1"/>
+                </a:solidFill>
+                <a:effectLst/>
+              </a:rPr>
+              <a:t> files and shapefiles</a:t>
+            </a:r>
+            <a:endParaRPr kumimoji="0" lang="en-US" altLang="en-US" sz="1800" b="0" i="0" u="none" strike="noStrike" cap="none" normalizeH="0" baseline="0" dirty="0">
+              <a:ln>
+                <a:noFill/>
+              </a:ln>
+              <a:solidFill>
+                <a:schemeClr val="tx1"/>
+              </a:solidFill>
+              <a:effectLst/>
+            </a:endParaRPr>
+          </a:p>
+          <a:p>
+            <a:pPr marR="0" lvl="0" algn="l" defTabSz="914400" rtl="0" eaLnBrk="0" fontAlgn="base" latinLnBrk="0" hangingPunct="0">
+              <a:lnSpc>
+                <a:spcPct val="100000"/>
+              </a:lnSpc>
+              <a:spcBef>
+                <a:spcPct val="0"/>
+              </a:spcBef>
+              <a:spcAft>
+                <a:spcPct val="0"/>
+              </a:spcAft>
+              <a:buClrTx/>
+              <a:buSzTx/>
+              <a:buFont typeface="Wingdings" panose="05000000000000000000" pitchFamily="2" charset="2"/>
+              <a:buChar char="Ø"/>
+              <a:tabLst/>
+            </a:pPr>
+            <a:r>
+              <a:rPr kumimoji="0" lang="en-US" altLang="en-US" sz="1800" b="0" i="0" u="none" strike="noStrike" cap="none" normalizeH="0" baseline="0" dirty="0">
+                <a:ln>
+                  <a:noFill/>
+                </a:ln>
+                <a:solidFill>
+                  <a:schemeClr val="tx1"/>
+                </a:solidFill>
+                <a:effectLst/>
+              </a:rPr>
+              <a:t>Suitability prediction maps and exported </a:t>
+            </a:r>
+            <a:r>
+              <a:rPr kumimoji="0" lang="en-US" altLang="en-US" sz="1800" b="0" i="0" u="none" strike="noStrike" cap="none" normalizeH="0" baseline="0" dirty="0" err="1">
+                <a:ln>
+                  <a:noFill/>
+                </a:ln>
+                <a:solidFill>
+                  <a:schemeClr val="tx1"/>
+                </a:solidFill>
+                <a:effectLst/>
+              </a:rPr>
+              <a:t>GeoTIFFs</a:t>
+            </a:r>
+            <a:endParaRPr kumimoji="0" lang="en-US" altLang="en-US" sz="1800" b="0" i="0" u="none" strike="noStrike" cap="none" normalizeH="0" baseline="0" dirty="0">
+              <a:ln>
+                <a:noFill/>
+              </a:ln>
+              <a:solidFill>
+                <a:schemeClr val="tx1"/>
+              </a:solidFill>
+              <a:effectLst/>
+            </a:endParaRPr>
+          </a:p>
+          <a:p>
+            <a:pPr marR="0" lvl="0" algn="l" defTabSz="914400" rtl="0" eaLnBrk="0" fontAlgn="base" latinLnBrk="0" hangingPunct="0">
+              <a:lnSpc>
+                <a:spcPct val="100000"/>
+              </a:lnSpc>
+              <a:spcBef>
+                <a:spcPct val="0"/>
+              </a:spcBef>
+              <a:spcAft>
+                <a:spcPct val="0"/>
+              </a:spcAft>
+              <a:buClrTx/>
+              <a:buSzTx/>
+              <a:buFont typeface="Wingdings" panose="05000000000000000000" pitchFamily="2" charset="2"/>
+              <a:buChar char="Ø"/>
+              <a:tabLst/>
+            </a:pPr>
+            <a:r>
+              <a:rPr kumimoji="0" lang="en-US" altLang="en-US" sz="1800" b="0" i="0" u="none" strike="noStrike" cap="none" normalizeH="0" baseline="0" dirty="0">
+                <a:ln>
+                  <a:noFill/>
+                </a:ln>
+                <a:solidFill>
+                  <a:schemeClr val="tx1"/>
+                </a:solidFill>
+                <a:effectLst/>
+              </a:rPr>
+              <a:t>A deployable web application for interactive crop recommendations</a:t>
+            </a:r>
+            <a:endParaRPr kumimoji="0" lang="tr-TR" altLang="en-US" sz="1800" b="0" i="0" u="none" strike="noStrike" cap="none" normalizeH="0" baseline="0" dirty="0">
+              <a:ln>
+                <a:noFill/>
+              </a:ln>
+              <a:solidFill>
+                <a:schemeClr val="tx1"/>
+              </a:solidFill>
+              <a:effectLst/>
+            </a:endParaRPr>
+          </a:p>
+          <a:p>
+            <a:pPr marR="0" lvl="0" algn="l" defTabSz="914400" rtl="0" eaLnBrk="0" fontAlgn="base" latinLnBrk="0" hangingPunct="0">
+              <a:lnSpc>
+                <a:spcPct val="100000"/>
+              </a:lnSpc>
+              <a:spcBef>
+                <a:spcPct val="0"/>
+              </a:spcBef>
+              <a:spcAft>
+                <a:spcPct val="0"/>
+              </a:spcAft>
+              <a:buClrTx/>
+              <a:buSzTx/>
+              <a:buFont typeface="Wingdings" panose="05000000000000000000" pitchFamily="2" charset="2"/>
+              <a:buChar char="Ø"/>
+              <a:tabLst/>
+            </a:pPr>
+            <a:endParaRPr kumimoji="0" lang="en-US" altLang="en-US" sz="1800" b="0" i="0" u="none" strike="noStrike" cap="none" normalizeH="0" baseline="0" dirty="0">
+              <a:ln>
+                <a:noFill/>
+              </a:ln>
+              <a:solidFill>
+                <a:schemeClr val="tx1"/>
+              </a:solidFill>
+              <a:effectLst/>
+            </a:endParaRPr>
+          </a:p>
+          <a:p>
+            <a:pPr marL="0" marR="0" lvl="0" indent="0" algn="l" defTabSz="914400" rtl="0" eaLnBrk="0" fontAlgn="base" latinLnBrk="0" hangingPunct="0">
+              <a:lnSpc>
+                <a:spcPct val="100000"/>
+              </a:lnSpc>
+              <a:spcBef>
+                <a:spcPct val="0"/>
+              </a:spcBef>
+              <a:spcAft>
+                <a:spcPct val="0"/>
+              </a:spcAft>
+              <a:buClrTx/>
+              <a:buSzTx/>
+              <a:buFontTx/>
+              <a:buNone/>
+              <a:tabLst/>
+            </a:pPr>
+            <a:r>
+              <a:rPr kumimoji="0" lang="en-US" altLang="en-US" sz="1800" b="0" i="0" u="none" strike="noStrike" cap="none" normalizeH="0" baseline="0" dirty="0">
+                <a:ln>
+                  <a:noFill/>
+                </a:ln>
+                <a:solidFill>
+                  <a:schemeClr val="tx1"/>
+                </a:solidFill>
+                <a:effectLst/>
+              </a:rPr>
+              <a:t>📦 </a:t>
+            </a:r>
+            <a:r>
+              <a:rPr kumimoji="0" lang="en-US" altLang="en-US" sz="1800" b="1" i="0" u="none" strike="noStrike" cap="none" normalizeH="0" baseline="0" dirty="0">
+                <a:ln>
+                  <a:noFill/>
+                </a:ln>
+                <a:solidFill>
+                  <a:schemeClr val="tx1"/>
+                </a:solidFill>
+                <a:effectLst/>
+              </a:rPr>
+              <a:t>Usage</a:t>
+            </a:r>
+            <a:endParaRPr kumimoji="0" lang="tr-TR" altLang="en-US" sz="1800" b="1" i="0" u="none" strike="noStrike" cap="none" normalizeH="0" baseline="0" dirty="0">
+              <a:ln>
+                <a:noFill/>
+              </a:ln>
+              <a:solidFill>
+                <a:schemeClr val="tx1"/>
+              </a:solidFill>
+              <a:effectLst/>
+            </a:endParaRPr>
+          </a:p>
+          <a:p>
+            <a:pPr marL="0" marR="0" lvl="0" indent="0" algn="l" defTabSz="914400" rtl="0" eaLnBrk="0" fontAlgn="base" latinLnBrk="0" hangingPunct="0">
+              <a:lnSpc>
+                <a:spcPct val="100000"/>
+              </a:lnSpc>
+              <a:spcBef>
+                <a:spcPct val="0"/>
+              </a:spcBef>
+              <a:spcAft>
+                <a:spcPct val="0"/>
+              </a:spcAft>
+              <a:buClrTx/>
+              <a:buSzTx/>
+              <a:buFontTx/>
+              <a:buNone/>
+              <a:tabLst/>
+            </a:pPr>
+            <a:br>
+              <a:rPr kumimoji="0" lang="en-US" altLang="en-US" sz="1800" b="0" i="0" u="none" strike="noStrike" cap="none" normalizeH="0" baseline="0" dirty="0">
+                <a:ln>
+                  <a:noFill/>
+                </a:ln>
+                <a:solidFill>
+                  <a:schemeClr val="tx1"/>
+                </a:solidFill>
+                <a:effectLst/>
+              </a:rPr>
+            </a:br>
+            <a:r>
+              <a:rPr kumimoji="0" lang="en-US" altLang="en-US" sz="1800" b="0" i="0" u="none" strike="noStrike" cap="none" normalizeH="0" baseline="0" dirty="0">
+                <a:ln>
+                  <a:noFill/>
+                </a:ln>
+                <a:solidFill>
+                  <a:schemeClr val="tx1"/>
+                </a:solidFill>
+                <a:effectLst/>
+              </a:rPr>
+              <a:t>Users can view, clone, or download the full project to test models, review methodology,</a:t>
+            </a:r>
+            <a:endParaRPr kumimoji="0" lang="tr-TR" altLang="en-US" sz="1800" b="0" i="0" u="none" strike="noStrike" cap="none" normalizeH="0" baseline="0" dirty="0">
+              <a:ln>
+                <a:noFill/>
+              </a:ln>
+              <a:solidFill>
+                <a:schemeClr val="tx1"/>
+              </a:solidFill>
+              <a:effectLst/>
+            </a:endParaRPr>
+          </a:p>
+          <a:p>
+            <a:pPr marL="0" marR="0" lvl="0" indent="0" algn="l" defTabSz="914400" rtl="0" eaLnBrk="0" fontAlgn="base" latinLnBrk="0" hangingPunct="0">
+              <a:lnSpc>
+                <a:spcPct val="100000"/>
+              </a:lnSpc>
+              <a:spcBef>
+                <a:spcPct val="0"/>
+              </a:spcBef>
+              <a:spcAft>
+                <a:spcPct val="0"/>
+              </a:spcAft>
+              <a:buClrTx/>
+              <a:buSzTx/>
+              <a:buFontTx/>
+              <a:buNone/>
+              <a:tabLst/>
+            </a:pPr>
+            <a:r>
+              <a:rPr kumimoji="0" lang="en-US" altLang="en-US" sz="1800" b="0" i="0" u="none" strike="noStrike" cap="none" normalizeH="0" baseline="0" dirty="0">
+                <a:ln>
+                  <a:noFill/>
+                </a:ln>
+                <a:solidFill>
+                  <a:schemeClr val="tx1"/>
+                </a:solidFill>
+                <a:effectLst/>
+              </a:rPr>
+              <a:t> or integrate it into future GIS research or agricultural decision-making systems.</a:t>
             </a:r>
           </a:p>
         </p:txBody>
@@ -9378,7 +10102,7 @@
     </p:spTree>
     <p:extLst>
       <p:ext uri="{BB962C8B-B14F-4D97-AF65-F5344CB8AC3E}">
-        <p14:creationId xmlns:p14="http://schemas.microsoft.com/office/powerpoint/2010/main" val="4059286224"/>
+        <p14:creationId xmlns:p14="http://schemas.microsoft.com/office/powerpoint/2010/main" val="149193553"/>
       </p:ext>
     </p:extLst>
   </p:cSld>
@@ -9410,7 +10134,7 @@
           <p:cNvPr id="2" name="Başlık 1">
             <a:extLst>
               <a:ext uri="{FF2B5EF4-FFF2-40B4-BE49-F238E27FC236}">
-                <a16:creationId xmlns:a16="http://schemas.microsoft.com/office/drawing/2014/main" id="{373E9F01-3F1D-3726-6AA5-DAE54DE3AF99}"/>
+                <a16:creationId xmlns:a16="http://schemas.microsoft.com/office/drawing/2014/main" id="{B4334864-9A61-1C96-37F8-AB9A3AFB7D23}"/>
               </a:ext>
             </a:extLst>
           </p:cNvPr>
@@ -9428,7 +10152,7 @@
           <a:p>
             <a:r>
               <a:rPr lang="en-CA" dirty="0"/>
-              <a:t>10. Appendices</a:t>
+              <a:t>9. Conclusion</a:t>
             </a:r>
           </a:p>
         </p:txBody>
@@ -9438,7 +10162,7 @@
           <p:cNvPr id="3" name="İçerik Yer Tutucusu 2">
             <a:extLst>
               <a:ext uri="{FF2B5EF4-FFF2-40B4-BE49-F238E27FC236}">
-                <a16:creationId xmlns:a16="http://schemas.microsoft.com/office/drawing/2014/main" id="{AEA24BC0-A06E-F2CF-DB65-07ED7E71F278}"/>
+                <a16:creationId xmlns:a16="http://schemas.microsoft.com/office/drawing/2014/main" id="{F69CDEC6-5717-D043-5185-132230A035A6}"/>
               </a:ext>
             </a:extLst>
           </p:cNvPr>
@@ -9449,112 +10173,25 @@
             <p:ph idx="1"/>
           </p:nvPr>
         </p:nvSpPr>
-        <p:spPr>
-          <a:xfrm>
-            <a:off x="1295402" y="2167187"/>
-            <a:ext cx="9601196" cy="3318936"/>
-          </a:xfrm>
-        </p:spPr>
-        <p:txBody>
-          <a:bodyPr>
-            <a:normAutofit fontScale="77500" lnSpcReduction="20000"/>
-          </a:bodyPr>
+        <p:spPr/>
+        <p:txBody>
+          <a:bodyPr/>
           <a:lstStyle/>
           <a:p>
-            <a:pPr marL="457200" indent="-457200">
-              <a:buAutoNum type="alphaUcPeriod"/>
+            <a:pPr marL="0" indent="0">
+              <a:buNone/>
             </a:pPr>
             <a:r>
-              <a:rPr lang="en-CA" b="1" dirty="0"/>
-              <a:t>Code Snippets</a:t>
-            </a:r>
-          </a:p>
-          <a:p>
-            <a:pPr>
-              <a:buFont typeface="Arial" panose="020B0604020202020204" pitchFamily="34" charset="0"/>
-              <a:buChar char="•"/>
-            </a:pPr>
-            <a:r>
               <a:rPr lang="en-CA" dirty="0"/>
-              <a:t>Full Google Earth Engine scripts for data acquisition and feature extraction.</a:t>
-            </a:r>
-          </a:p>
-          <a:p>
-            <a:pPr>
-              <a:buFont typeface="Arial" panose="020B0604020202020204" pitchFamily="34" charset="0"/>
-              <a:buChar char="•"/>
-            </a:pPr>
-            <a:r>
-              <a:rPr lang="en-CA" dirty="0"/>
-              <a:t>Python (</a:t>
-            </a:r>
-            <a:r>
-              <a:rPr lang="en-CA" dirty="0" err="1"/>
-              <a:t>Colab</a:t>
-            </a:r>
-            <a:r>
-              <a:rPr lang="en-CA" dirty="0"/>
-              <a:t>) scripts for data preprocessing, model training, evaluation, and suitability mapping.</a:t>
-            </a:r>
-          </a:p>
-          <a:p>
-            <a:pPr>
-              <a:buFont typeface="Arial" panose="020B0604020202020204" pitchFamily="34" charset="0"/>
-              <a:buChar char="•"/>
-            </a:pPr>
-            <a:r>
-              <a:rPr lang="en-CA" dirty="0"/>
-              <a:t>Flask/Leaflet application source code</a:t>
-            </a:r>
-            <a:r>
-              <a:rPr lang="tr-TR" dirty="0"/>
-              <a:t>.</a:t>
-            </a:r>
-          </a:p>
-          <a:p>
-            <a:pPr marL="0" indent="0">
-              <a:buNone/>
-            </a:pPr>
-            <a:endParaRPr lang="en-CA" dirty="0"/>
-          </a:p>
-          <a:p>
-            <a:pPr marL="0" indent="0">
-              <a:buNone/>
-            </a:pPr>
-            <a:r>
-              <a:rPr lang="en-CA" b="1" dirty="0"/>
-              <a:t>B. Maps and Figures</a:t>
-            </a:r>
-          </a:p>
-          <a:p>
-            <a:pPr>
-              <a:buFont typeface="Arial" panose="020B0604020202020204" pitchFamily="34" charset="0"/>
-              <a:buChar char="•"/>
-            </a:pPr>
-            <a:r>
-              <a:rPr lang="en-CA" dirty="0"/>
-              <a:t>Sample satellite images with date annotation.</a:t>
-            </a:r>
-          </a:p>
-          <a:p>
-            <a:pPr>
-              <a:buFont typeface="Arial" panose="020B0604020202020204" pitchFamily="34" charset="0"/>
-              <a:buChar char="•"/>
-            </a:pPr>
-            <a:r>
-              <a:rPr lang="en-CA" dirty="0"/>
-              <a:t>Visualization of feature layers and final suitability map.</a:t>
-            </a:r>
-          </a:p>
-          <a:p>
-            <a:endParaRPr lang="en-CA" dirty="0"/>
+              <a:t>This project successfully developed a GIS-ML-based crop recommendation system for Antalya, Turkey. By utilizing spatial data and machine learning, the system can predict crop suitability and assist farmers in making informed decisions. The system's web interface provides an accessible tool for farmers to receive tailored recommendations, promoting more sustainable agricultural practices.</a:t>
+            </a:r>
           </a:p>
         </p:txBody>
       </p:sp>
     </p:spTree>
     <p:extLst>
       <p:ext uri="{BB962C8B-B14F-4D97-AF65-F5344CB8AC3E}">
-        <p14:creationId xmlns:p14="http://schemas.microsoft.com/office/powerpoint/2010/main" val="1621008952"/>
+        <p14:creationId xmlns:p14="http://schemas.microsoft.com/office/powerpoint/2010/main" val="4059286224"/>
       </p:ext>
     </p:extLst>
   </p:cSld>
@@ -9586,7 +10223,7 @@
           <p:cNvPr id="2" name="Başlık 1">
             <a:extLst>
               <a:ext uri="{FF2B5EF4-FFF2-40B4-BE49-F238E27FC236}">
-                <a16:creationId xmlns:a16="http://schemas.microsoft.com/office/drawing/2014/main" id="{FD4E8CB5-A9C5-B343-E656-C18CCFF78147}"/>
+                <a16:creationId xmlns:a16="http://schemas.microsoft.com/office/drawing/2014/main" id="{373E9F01-3F1D-3726-6AA5-DAE54DE3AF99}"/>
               </a:ext>
             </a:extLst>
           </p:cNvPr>
@@ -9602,616 +10239,616 @@
           <a:bodyPr/>
           <a:lstStyle/>
           <a:p>
-            <a:pPr algn="ctr"/>
-            <a:r>
-              <a:rPr lang="en-CA" b="1" dirty="0"/>
-              <a:t>1</a:t>
-            </a:r>
-            <a:r>
-              <a:rPr lang="tr-TR" b="1" dirty="0"/>
-              <a:t>1</a:t>
-            </a:r>
-            <a:r>
-              <a:rPr lang="en-CA" b="1" dirty="0"/>
-              <a:t>. References</a:t>
-            </a:r>
-            <a:endParaRPr lang="en-CA" dirty="0"/>
-          </a:p>
-        </p:txBody>
-      </p:sp>
-      <p:sp>
-        <p:nvSpPr>
-          <p:cNvPr id="4" name="Rectangle 1">
+            <a:r>
+              <a:rPr lang="en-CA" dirty="0"/>
+              <a:t>10. Appendices</a:t>
+            </a:r>
+          </a:p>
+        </p:txBody>
+      </p:sp>
+      <p:sp>
+        <p:nvSpPr>
+          <p:cNvPr id="3" name="İçerik Yer Tutucusu 2">
             <a:extLst>
               <a:ext uri="{FF2B5EF4-FFF2-40B4-BE49-F238E27FC236}">
-                <a16:creationId xmlns:a16="http://schemas.microsoft.com/office/drawing/2014/main" id="{55FC86D2-0D8F-B9EF-CFD9-DE4A1BFEBA08}"/>
+                <a16:creationId xmlns:a16="http://schemas.microsoft.com/office/drawing/2014/main" id="{AEA24BC0-A06E-F2CF-DB65-07ED7E71F278}"/>
               </a:ext>
             </a:extLst>
           </p:cNvPr>
           <p:cNvSpPr>
-            <a:spLocks noGrp="1" noChangeArrowheads="1"/>
+            <a:spLocks noGrp="1"/>
           </p:cNvSpPr>
           <p:nvPr>
             <p:ph idx="1"/>
           </p:nvPr>
         </p:nvSpPr>
-        <p:spPr bwMode="auto">
+        <p:spPr>
           <a:xfrm>
-            <a:off x="1633929" y="2459548"/>
-            <a:ext cx="8169639" cy="3416320"/>
+            <a:off x="1295402" y="2167187"/>
+            <a:ext cx="9601196" cy="3318936"/>
+          </a:xfrm>
+        </p:spPr>
+        <p:txBody>
+          <a:bodyPr>
+            <a:normAutofit fontScale="77500" lnSpcReduction="20000"/>
+          </a:bodyPr>
+          <a:lstStyle/>
+          <a:p>
+            <a:pPr marL="457200" indent="-457200">
+              <a:buAutoNum type="alphaUcPeriod"/>
+            </a:pPr>
+            <a:r>
+              <a:rPr lang="en-CA" b="1" dirty="0"/>
+              <a:t>Code Snippets</a:t>
+            </a:r>
+          </a:p>
+          <a:p>
+            <a:pPr>
+              <a:buFont typeface="Arial" panose="020B0604020202020204" pitchFamily="34" charset="0"/>
+              <a:buChar char="•"/>
+            </a:pPr>
+            <a:r>
+              <a:rPr lang="en-CA" dirty="0"/>
+              <a:t>Full Google Earth Engine scripts for data acquisition and feature extraction.</a:t>
+            </a:r>
+          </a:p>
+          <a:p>
+            <a:pPr>
+              <a:buFont typeface="Arial" panose="020B0604020202020204" pitchFamily="34" charset="0"/>
+              <a:buChar char="•"/>
+            </a:pPr>
+            <a:r>
+              <a:rPr lang="en-CA" dirty="0"/>
+              <a:t>Python (</a:t>
+            </a:r>
+            <a:r>
+              <a:rPr lang="en-CA" dirty="0" err="1"/>
+              <a:t>Colab</a:t>
+            </a:r>
+            <a:r>
+              <a:rPr lang="en-CA" dirty="0"/>
+              <a:t>) scripts for data preprocessing, model training, evaluation, and suitability mapping.</a:t>
+            </a:r>
+          </a:p>
+          <a:p>
+            <a:pPr>
+              <a:buFont typeface="Arial" panose="020B0604020202020204" pitchFamily="34" charset="0"/>
+              <a:buChar char="•"/>
+            </a:pPr>
+            <a:r>
+              <a:rPr lang="en-CA" dirty="0"/>
+              <a:t>Flask/Leaflet application source code</a:t>
+            </a:r>
+            <a:r>
+              <a:rPr lang="tr-TR" dirty="0"/>
+              <a:t>.</a:t>
+            </a:r>
+          </a:p>
+          <a:p>
+            <a:pPr marL="0" indent="0">
+              <a:buNone/>
+            </a:pPr>
+            <a:endParaRPr lang="en-CA" dirty="0"/>
+          </a:p>
+          <a:p>
+            <a:pPr marL="0" indent="0">
+              <a:buNone/>
+            </a:pPr>
+            <a:r>
+              <a:rPr lang="en-CA" b="1" dirty="0"/>
+              <a:t>B. Maps and Figures</a:t>
+            </a:r>
+          </a:p>
+          <a:p>
+            <a:pPr>
+              <a:buFont typeface="Arial" panose="020B0604020202020204" pitchFamily="34" charset="0"/>
+              <a:buChar char="•"/>
+            </a:pPr>
+            <a:r>
+              <a:rPr lang="en-CA" dirty="0"/>
+              <a:t>Sample satellite images with date annotation.</a:t>
+            </a:r>
+          </a:p>
+          <a:p>
+            <a:pPr>
+              <a:buFont typeface="Arial" panose="020B0604020202020204" pitchFamily="34" charset="0"/>
+              <a:buChar char="•"/>
+            </a:pPr>
+            <a:r>
+              <a:rPr lang="en-CA" dirty="0"/>
+              <a:t>Visualization of feature layers and final suitability map.</a:t>
+            </a:r>
+          </a:p>
+          <a:p>
+            <a:endParaRPr lang="en-CA" dirty="0"/>
+          </a:p>
+        </p:txBody>
+      </p:sp>
+    </p:spTree>
+    <p:extLst>
+      <p:ext uri="{BB962C8B-B14F-4D97-AF65-F5344CB8AC3E}">
+        <p14:creationId xmlns:p14="http://schemas.microsoft.com/office/powerpoint/2010/main" val="1621008952"/>
+      </p:ext>
+    </p:extLst>
+  </p:cSld>
+  <p:clrMapOvr>
+    <a:masterClrMapping/>
+  </p:clrMapOvr>
+</p:sld>
+</file>
+
+<file path=ppt/slides/slide27.xml><?xml version="1.0" encoding="utf-8"?>
+<p:sld xmlns:a="http://schemas.openxmlformats.org/drawingml/2006/main" xmlns:r="http://schemas.openxmlformats.org/officeDocument/2006/relationships" xmlns:p="http://schemas.openxmlformats.org/presentationml/2006/main">
+  <p:cSld>
+    <p:spTree>
+      <p:nvGrpSpPr>
+        <p:cNvPr id="1" name=""/>
+        <p:cNvGrpSpPr/>
+        <p:nvPr/>
+      </p:nvGrpSpPr>
+      <p:grpSpPr>
+        <a:xfrm>
+          <a:off x="0" y="0"/>
+          <a:ext cx="0" cy="0"/>
+          <a:chOff x="0" y="0"/>
+          <a:chExt cx="0" cy="0"/>
+        </a:xfrm>
+      </p:grpSpPr>
+      <p:sp>
+        <p:nvSpPr>
+          <p:cNvPr id="2" name="Başlık 1">
+            <a:extLst>
+              <a:ext uri="{FF2B5EF4-FFF2-40B4-BE49-F238E27FC236}">
+                <a16:creationId xmlns:a16="http://schemas.microsoft.com/office/drawing/2014/main" id="{9ED173D8-C0EF-ED4C-DD58-DC4ED2EE15A8}"/>
+              </a:ext>
+            </a:extLst>
+          </p:cNvPr>
+          <p:cNvSpPr>
+            <a:spLocks noGrp="1"/>
+          </p:cNvSpPr>
+          <p:nvPr>
+            <p:ph type="title"/>
+          </p:nvPr>
+        </p:nvSpPr>
+        <p:spPr/>
+        <p:txBody>
+          <a:bodyPr>
+            <a:normAutofit fontScale="90000"/>
+          </a:bodyPr>
+          <a:lstStyle/>
+          <a:p>
+            <a:r>
+              <a:rPr lang="en-CA" b="1" i="0" dirty="0">
+                <a:solidFill>
+                  <a:srgbClr val="404040"/>
+                </a:solidFill>
+                <a:effectLst/>
+                <a:latin typeface="+mn-lt"/>
+              </a:rPr>
+              <a:t>Key Outputs from Project A1 – Model Metrics &amp; Suitability Layers</a:t>
+            </a:r>
+            <a:endParaRPr lang="en-CA" dirty="0">
+              <a:latin typeface="+mn-lt"/>
+            </a:endParaRPr>
+          </a:p>
+        </p:txBody>
+      </p:sp>
+      <p:sp>
+        <p:nvSpPr>
+          <p:cNvPr id="3" name="İçerik Yer Tutucusu 2">
+            <a:extLst>
+              <a:ext uri="{FF2B5EF4-FFF2-40B4-BE49-F238E27FC236}">
+                <a16:creationId xmlns:a16="http://schemas.microsoft.com/office/drawing/2014/main" id="{274B1B2C-4C5D-75A5-8778-45709E3BD2FA}"/>
+              </a:ext>
+            </a:extLst>
+          </p:cNvPr>
+          <p:cNvSpPr>
+            <a:spLocks noGrp="1"/>
+          </p:cNvSpPr>
+          <p:nvPr>
+            <p:ph idx="1"/>
+          </p:nvPr>
+        </p:nvSpPr>
+        <p:spPr/>
+        <p:txBody>
+          <a:bodyPr/>
+          <a:lstStyle/>
+          <a:p>
+            <a:r>
+              <a:rPr lang="en-CA" b="0" i="1" dirty="0">
+                <a:solidFill>
+                  <a:srgbClr val="404040"/>
+                </a:solidFill>
+                <a:effectLst/>
+                <a:latin typeface="quote-cjk-patch"/>
+              </a:rPr>
+              <a:t>Feature Layers for Crop Suitability Modeling</a:t>
+            </a:r>
+            <a:endParaRPr lang="tr-TR" b="0" i="1" dirty="0">
+              <a:solidFill>
+                <a:srgbClr val="404040"/>
+              </a:solidFill>
+              <a:effectLst/>
+              <a:latin typeface="quote-cjk-patch"/>
+            </a:endParaRPr>
+          </a:p>
+          <a:p>
+            <a:endParaRPr lang="tr-TR" i="1" dirty="0">
+              <a:solidFill>
+                <a:srgbClr val="404040"/>
+              </a:solidFill>
+              <a:latin typeface="quote-cjk-patch"/>
+            </a:endParaRPr>
+          </a:p>
+          <a:p>
+            <a:pPr marL="0" indent="0">
+              <a:buNone/>
+            </a:pPr>
+            <a:endParaRPr lang="en-CA" dirty="0"/>
+          </a:p>
+        </p:txBody>
+      </p:sp>
+      <p:pic>
+        <p:nvPicPr>
+          <p:cNvPr id="5" name="Resim 4" descr="metin, harita, ekran görüntüsü içeren bir resim&#10;&#10;Yapay zeka tarafından oluşturulan içerik yanlış olabilir.">
+            <a:extLst>
+              <a:ext uri="{FF2B5EF4-FFF2-40B4-BE49-F238E27FC236}">
+                <a16:creationId xmlns:a16="http://schemas.microsoft.com/office/drawing/2014/main" id="{586C27FA-A831-1D9E-4DFF-BCD3785A240D}"/>
+              </a:ext>
+            </a:extLst>
+          </p:cNvPr>
+          <p:cNvPicPr>
+            <a:picLocks noChangeAspect="1"/>
+          </p:cNvPicPr>
+          <p:nvPr/>
+        </p:nvPicPr>
+        <p:blipFill>
+          <a:blip r:embed="rId2">
+            <a:extLst>
+              <a:ext uri="{28A0092B-C50C-407E-A947-70E740481C1C}">
+                <a14:useLocalDpi xmlns:a14="http://schemas.microsoft.com/office/drawing/2010/main" val="0"/>
+              </a:ext>
+            </a:extLst>
+          </a:blip>
+          <a:stretch>
+            <a:fillRect/>
+          </a:stretch>
+        </p:blipFill>
+        <p:spPr>
+          <a:xfrm>
+            <a:off x="2853484" y="3047272"/>
+            <a:ext cx="7068438" cy="3099529"/>
           </a:xfrm>
           <a:prstGeom prst="rect">
             <a:avLst/>
           </a:prstGeom>
-          <a:noFill/>
-          <a:ln>
-            <a:noFill/>
-          </a:ln>
-          <a:effectLst/>
-          <a:extLst>
-            <a:ext uri="{909E8E84-426E-40DD-AFC4-6F175D3DCCD1}">
-              <a14:hiddenFill xmlns:a14="http://schemas.microsoft.com/office/drawing/2010/main">
-                <a:solidFill>
-                  <a:schemeClr val="accent1"/>
-                </a:solidFill>
-              </a14:hiddenFill>
-            </a:ext>
-            <a:ext uri="{91240B29-F687-4F45-9708-019B960494DF}">
-              <a14:hiddenLine xmlns:a14="http://schemas.microsoft.com/office/drawing/2010/main" w="9525">
-                <a:solidFill>
-                  <a:schemeClr val="tx1"/>
-                </a:solidFill>
-                <a:miter lim="800000"/>
-                <a:headEnd/>
-                <a:tailEnd/>
-              </a14:hiddenLine>
-            </a:ext>
-            <a:ext uri="{AF507438-7753-43E0-B8FC-AC1667EBCBE1}">
-              <a14:hiddenEffects xmlns:a14="http://schemas.microsoft.com/office/drawing/2010/main">
-                <a:effectLst>
-                  <a:outerShdw dist="35921" dir="2700000" algn="ctr" rotWithShape="0">
-                    <a:schemeClr val="bg2"/>
-                  </a:outerShdw>
-                </a:effectLst>
-              </a14:hiddenEffects>
-            </a:ext>
-          </a:extLst>
         </p:spPr>
-        <p:txBody>
-          <a:bodyPr vert="horz" wrap="square" lIns="91440" tIns="45720" rIns="91440" bIns="45720" numCol="1" anchor="ctr" anchorCtr="0" compatLnSpc="1">
-            <a:prstTxWarp prst="textNoShape">
-              <a:avLst/>
-            </a:prstTxWarp>
-            <a:spAutoFit/>
-          </a:bodyPr>
-          <a:lstStyle/>
-          <a:p>
-            <a:pPr marL="0" marR="0" lvl="0" indent="0" algn="l" defTabSz="914400" rtl="0" eaLnBrk="0" fontAlgn="base" latinLnBrk="0" hangingPunct="0">
-              <a:lnSpc>
-                <a:spcPct val="100000"/>
-              </a:lnSpc>
-              <a:spcBef>
-                <a:spcPct val="0"/>
-              </a:spcBef>
-              <a:spcAft>
-                <a:spcPct val="0"/>
-              </a:spcAft>
-              <a:buClrTx/>
-              <a:buSzTx/>
-              <a:buNone/>
-              <a:tabLst/>
-            </a:pPr>
-            <a:r>
-              <a:rPr kumimoji="0" lang="en-US" altLang="en-US" b="0" i="0" u="none" strike="noStrike" cap="none" normalizeH="0" baseline="0" dirty="0">
-                <a:ln>
-                  <a:noFill/>
-                </a:ln>
-                <a:solidFill>
-                  <a:schemeClr val="tx1"/>
-                </a:solidFill>
-                <a:effectLst/>
-              </a:rPr>
-              <a:t>[1] Google Earth Engine. </a:t>
-            </a:r>
-            <a:r>
-              <a:rPr kumimoji="0" lang="en-US" altLang="en-US" b="0" i="0" u="none" strike="noStrike" cap="none" normalizeH="0" baseline="0" dirty="0">
-                <a:ln>
-                  <a:noFill/>
-                </a:ln>
-                <a:solidFill>
-                  <a:schemeClr val="tx1"/>
-                </a:solidFill>
-                <a:effectLst/>
-                <a:hlinkClick r:id="rId2"/>
-              </a:rPr>
-              <a:t>https://earthengine.google.com/</a:t>
-            </a:r>
-            <a:endParaRPr kumimoji="0" lang="en-US" altLang="en-US" b="0" i="0" u="none" strike="noStrike" cap="none" normalizeH="0" baseline="0" dirty="0">
-              <a:ln>
-                <a:noFill/>
-              </a:ln>
-              <a:solidFill>
-                <a:schemeClr val="tx1"/>
-              </a:solidFill>
-              <a:effectLst/>
-            </a:endParaRPr>
-          </a:p>
-          <a:p>
-            <a:pPr marL="0" marR="0" lvl="0" indent="0" algn="l" defTabSz="914400" rtl="0" eaLnBrk="0" fontAlgn="base" latinLnBrk="0" hangingPunct="0">
-              <a:lnSpc>
-                <a:spcPct val="100000"/>
-              </a:lnSpc>
-              <a:spcBef>
-                <a:spcPct val="0"/>
-              </a:spcBef>
-              <a:spcAft>
-                <a:spcPct val="0"/>
-              </a:spcAft>
-              <a:buClrTx/>
-              <a:buSzTx/>
-              <a:buNone/>
-              <a:tabLst/>
-            </a:pPr>
-            <a:r>
-              <a:rPr kumimoji="0" lang="en-US" altLang="en-US" b="0" i="0" u="none" strike="noStrike" cap="none" normalizeH="0" baseline="0" dirty="0">
-                <a:ln>
-                  <a:noFill/>
-                </a:ln>
-                <a:solidFill>
-                  <a:schemeClr val="tx1"/>
-                </a:solidFill>
-                <a:effectLst/>
-              </a:rPr>
-              <a:t>[2] FAO Soil Data. </a:t>
-            </a:r>
-            <a:r>
-              <a:rPr kumimoji="0" lang="en-US" altLang="en-US" b="0" i="0" u="none" strike="noStrike" cap="none" normalizeH="0" baseline="0" dirty="0">
-                <a:ln>
-                  <a:noFill/>
-                </a:ln>
-                <a:solidFill>
-                  <a:schemeClr val="tx1"/>
-                </a:solidFill>
-                <a:effectLst/>
-                <a:hlinkClick r:id="rId3"/>
-              </a:rPr>
-              <a:t>https://www.fao.org/soils-portal</a:t>
-            </a:r>
-            <a:endParaRPr kumimoji="0" lang="en-US" altLang="en-US" b="0" i="0" u="none" strike="noStrike" cap="none" normalizeH="0" baseline="0" dirty="0">
-              <a:ln>
-                <a:noFill/>
-              </a:ln>
-              <a:solidFill>
-                <a:schemeClr val="tx1"/>
-              </a:solidFill>
-              <a:effectLst/>
-            </a:endParaRPr>
-          </a:p>
-          <a:p>
-            <a:pPr marL="0" marR="0" lvl="0" indent="0" algn="l" defTabSz="914400" rtl="0" eaLnBrk="0" fontAlgn="base" latinLnBrk="0" hangingPunct="0">
-              <a:lnSpc>
-                <a:spcPct val="100000"/>
-              </a:lnSpc>
-              <a:spcBef>
-                <a:spcPct val="0"/>
-              </a:spcBef>
-              <a:spcAft>
-                <a:spcPct val="0"/>
-              </a:spcAft>
-              <a:buClrTx/>
-              <a:buSzTx/>
-              <a:buNone/>
-              <a:tabLst/>
-            </a:pPr>
-            <a:r>
-              <a:rPr kumimoji="0" lang="en-US" altLang="en-US" b="0" i="0" u="none" strike="noStrike" cap="none" normalizeH="0" baseline="0" dirty="0">
-                <a:ln>
-                  <a:noFill/>
-                </a:ln>
-                <a:solidFill>
-                  <a:schemeClr val="tx1"/>
-                </a:solidFill>
-                <a:effectLst/>
-              </a:rPr>
-              <a:t>[3] </a:t>
-            </a:r>
-            <a:r>
-              <a:rPr kumimoji="0" lang="en-US" altLang="en-US" b="0" i="0" u="none" strike="noStrike" cap="none" normalizeH="0" baseline="0" noProof="1">
-                <a:ln>
-                  <a:noFill/>
-                </a:ln>
-                <a:solidFill>
-                  <a:schemeClr val="tx1"/>
-                </a:solidFill>
-                <a:effectLst/>
-              </a:rPr>
-              <a:t>Breiman</a:t>
-            </a:r>
-            <a:r>
-              <a:rPr kumimoji="0" lang="en-US" altLang="en-US" b="0" i="0" u="none" strike="noStrike" cap="none" normalizeH="0" baseline="0" dirty="0">
-                <a:ln>
-                  <a:noFill/>
-                </a:ln>
-                <a:solidFill>
-                  <a:schemeClr val="tx1"/>
-                </a:solidFill>
-                <a:effectLst/>
-              </a:rPr>
-              <a:t>, L. (2001). Random Forests. Machine Learning.</a:t>
-            </a:r>
-          </a:p>
-          <a:p>
-            <a:pPr marL="0" marR="0" lvl="0" indent="0" algn="l" defTabSz="914400" rtl="0" eaLnBrk="0" fontAlgn="base" latinLnBrk="0" hangingPunct="0">
-              <a:lnSpc>
-                <a:spcPct val="100000"/>
-              </a:lnSpc>
-              <a:spcBef>
-                <a:spcPct val="0"/>
-              </a:spcBef>
-              <a:spcAft>
-                <a:spcPct val="0"/>
-              </a:spcAft>
-              <a:buClrTx/>
-              <a:buSzTx/>
-              <a:buNone/>
-              <a:tabLst/>
-            </a:pPr>
-            <a:r>
-              <a:rPr kumimoji="0" lang="en-US" altLang="en-US" b="0" i="0" u="none" strike="noStrike" cap="none" normalizeH="0" baseline="0" dirty="0">
-                <a:ln>
-                  <a:noFill/>
-                </a:ln>
-                <a:solidFill>
-                  <a:schemeClr val="tx1"/>
-                </a:solidFill>
-                <a:effectLst/>
-              </a:rPr>
-              <a:t>[4] </a:t>
-            </a:r>
-            <a:r>
-              <a:rPr kumimoji="0" lang="en-US" altLang="en-US" b="0" i="0" u="none" strike="noStrike" cap="none" normalizeH="0" baseline="0" noProof="1">
-                <a:ln>
-                  <a:noFill/>
-                </a:ln>
-                <a:solidFill>
-                  <a:schemeClr val="tx1"/>
-                </a:solidFill>
-                <a:effectLst/>
-              </a:rPr>
-              <a:t>XGBoost</a:t>
-            </a:r>
-            <a:r>
-              <a:rPr kumimoji="0" lang="en-US" altLang="en-US" b="0" i="0" u="none" strike="noStrike" cap="none" normalizeH="0" baseline="0" dirty="0">
-                <a:ln>
-                  <a:noFill/>
-                </a:ln>
-                <a:solidFill>
-                  <a:schemeClr val="tx1"/>
-                </a:solidFill>
-                <a:effectLst/>
-              </a:rPr>
-              <a:t> Documentation. </a:t>
-            </a:r>
-            <a:r>
-              <a:rPr kumimoji="0" lang="en-US" altLang="en-US" b="0" i="0" u="none" strike="noStrike" cap="none" normalizeH="0" baseline="0" dirty="0">
-                <a:ln>
-                  <a:noFill/>
-                </a:ln>
-                <a:solidFill>
-                  <a:schemeClr val="tx1"/>
-                </a:solidFill>
-                <a:effectLst/>
-                <a:hlinkClick r:id="rId4"/>
-              </a:rPr>
-              <a:t>https://xgboost.readthedocs.io/</a:t>
-            </a:r>
-            <a:endParaRPr kumimoji="0" lang="en-US" altLang="en-US" b="0" i="0" u="none" strike="noStrike" cap="none" normalizeH="0" baseline="0" dirty="0">
-              <a:ln>
-                <a:noFill/>
-              </a:ln>
-              <a:solidFill>
-                <a:schemeClr val="tx1"/>
-              </a:solidFill>
-              <a:effectLst/>
-            </a:endParaRPr>
-          </a:p>
-          <a:p>
-            <a:pPr marL="0" marR="0" lvl="0" indent="0" algn="l" defTabSz="914400" rtl="0" eaLnBrk="0" fontAlgn="base" latinLnBrk="0" hangingPunct="0">
-              <a:lnSpc>
-                <a:spcPct val="100000"/>
-              </a:lnSpc>
-              <a:spcBef>
-                <a:spcPct val="0"/>
-              </a:spcBef>
-              <a:spcAft>
-                <a:spcPct val="0"/>
-              </a:spcAft>
-              <a:buClrTx/>
-              <a:buSzTx/>
-              <a:buNone/>
-              <a:tabLst/>
-            </a:pPr>
-            <a:r>
-              <a:rPr kumimoji="0" lang="en-US" altLang="en-US" b="0" i="0" u="none" strike="noStrike" cap="none" normalizeH="0" baseline="0" dirty="0">
-                <a:ln>
-                  <a:noFill/>
-                </a:ln>
-                <a:solidFill>
-                  <a:schemeClr val="tx1"/>
-                </a:solidFill>
-                <a:effectLst/>
-              </a:rPr>
-              <a:t>[5] Sentinel-2 Data Hub. https://scihub.copernicus.eu/</a:t>
-            </a:r>
-            <a:br>
-              <a:rPr kumimoji="0" lang="en-US" altLang="en-US" b="0" i="0" u="none" strike="noStrike" cap="none" normalizeH="0" baseline="0" dirty="0">
-                <a:ln>
-                  <a:noFill/>
-                </a:ln>
-                <a:solidFill>
-                  <a:schemeClr val="tx1"/>
-                </a:solidFill>
-                <a:effectLst/>
-              </a:rPr>
-            </a:br>
-            <a:r>
-              <a:rPr kumimoji="0" lang="en-US" altLang="en-US" b="0" i="0" u="none" strike="noStrike" cap="none" normalizeH="0" baseline="0" dirty="0">
-                <a:ln>
-                  <a:noFill/>
-                </a:ln>
-                <a:solidFill>
-                  <a:schemeClr val="tx1"/>
-                </a:solidFill>
-                <a:effectLst/>
-              </a:rPr>
-              <a:t>(</a:t>
-            </a:r>
-            <a:r>
-              <a:rPr kumimoji="0" lang="en-US" altLang="en-US" b="0" i="1" u="none" strike="noStrike" cap="none" normalizeH="0" baseline="0" dirty="0">
-                <a:ln>
-                  <a:noFill/>
-                </a:ln>
-                <a:solidFill>
-                  <a:schemeClr val="tx1"/>
-                </a:solidFill>
-                <a:effectLst/>
-              </a:rPr>
-              <a:t>Add all relevant sources used</a:t>
-            </a:r>
-            <a:r>
-              <a:rPr kumimoji="0" lang="en-US" altLang="en-US" b="0" i="0" u="none" strike="noStrike" cap="none" normalizeH="0" baseline="0" dirty="0">
-                <a:ln>
-                  <a:noFill/>
-                </a:ln>
-                <a:solidFill>
-                  <a:schemeClr val="tx1"/>
-                </a:solidFill>
-                <a:effectLst/>
-              </a:rPr>
-              <a:t>)</a:t>
-            </a:r>
-            <a:endParaRPr kumimoji="0" lang="tr-TR" altLang="en-US" b="0" i="0" u="none" strike="noStrike" cap="none" normalizeH="0" baseline="0" dirty="0">
-              <a:ln>
-                <a:noFill/>
-              </a:ln>
-              <a:solidFill>
-                <a:schemeClr val="tx1"/>
-              </a:solidFill>
-              <a:effectLst/>
-            </a:endParaRPr>
-          </a:p>
-          <a:p>
-            <a:pPr marL="0" marR="0" lvl="0" indent="0" algn="l" defTabSz="914400" rtl="0" eaLnBrk="0" fontAlgn="base" latinLnBrk="0" hangingPunct="0">
-              <a:lnSpc>
-                <a:spcPct val="100000"/>
-              </a:lnSpc>
-              <a:spcBef>
-                <a:spcPct val="0"/>
-              </a:spcBef>
-              <a:spcAft>
-                <a:spcPct val="0"/>
-              </a:spcAft>
-              <a:buClrTx/>
-              <a:buSzTx/>
-              <a:buNone/>
-              <a:tabLst/>
-            </a:pPr>
-            <a:r>
-              <a:rPr kumimoji="0" lang="en-US" altLang="en-US" b="0" i="0" u="none" strike="noStrike" cap="none" normalizeH="0" baseline="0" dirty="0">
-                <a:ln>
-                  <a:noFill/>
-                </a:ln>
-                <a:solidFill>
-                  <a:schemeClr val="tx1"/>
-                </a:solidFill>
-                <a:effectLst/>
-              </a:rPr>
-              <a:t>[</a:t>
-            </a:r>
-            <a:r>
-              <a:rPr kumimoji="0" lang="tr-TR" altLang="en-US" b="0" i="0" u="none" strike="noStrike" cap="none" normalizeH="0" baseline="0" dirty="0">
-                <a:ln>
-                  <a:noFill/>
-                </a:ln>
-                <a:solidFill>
-                  <a:schemeClr val="tx1"/>
-                </a:solidFill>
-                <a:effectLst/>
-              </a:rPr>
-              <a:t>6</a:t>
-            </a:r>
-            <a:r>
-              <a:rPr kumimoji="0" lang="en-US" altLang="en-US" b="0" i="0" u="none" strike="noStrike" cap="none" normalizeH="0" baseline="0" dirty="0">
-                <a:ln>
-                  <a:noFill/>
-                </a:ln>
-                <a:solidFill>
-                  <a:schemeClr val="tx1"/>
-                </a:solidFill>
-                <a:effectLst/>
-              </a:rPr>
-              <a:t>]</a:t>
-            </a:r>
-            <a:r>
-              <a:rPr kumimoji="0" lang="tr-TR" altLang="en-US" b="0" i="0" u="none" strike="noStrike" cap="none" normalizeH="0" baseline="0" dirty="0">
-                <a:ln>
-                  <a:noFill/>
-                </a:ln>
-                <a:solidFill>
-                  <a:schemeClr val="tx1"/>
-                </a:solidFill>
-                <a:effectLst/>
-              </a:rPr>
-              <a:t> </a:t>
-            </a:r>
-            <a:r>
-              <a:rPr lang="en-CA" dirty="0"/>
-              <a:t>Random Forest, </a:t>
-            </a:r>
-            <a:r>
-              <a:rPr lang="en-CA" noProof="1"/>
-              <a:t>LightGBM</a:t>
-            </a:r>
-            <a:r>
-              <a:rPr lang="en-CA" dirty="0"/>
-              <a:t> documentation.</a:t>
-            </a:r>
-            <a:endParaRPr lang="tr-TR" dirty="0"/>
-          </a:p>
-          <a:p>
-            <a:pPr marL="0" marR="0" lvl="0" indent="0" algn="l" defTabSz="914400" rtl="0" eaLnBrk="0" fontAlgn="base" latinLnBrk="0" hangingPunct="0">
-              <a:lnSpc>
-                <a:spcPct val="100000"/>
-              </a:lnSpc>
-              <a:spcBef>
-                <a:spcPct val="0"/>
-              </a:spcBef>
-              <a:spcAft>
-                <a:spcPct val="0"/>
-              </a:spcAft>
-              <a:buClrTx/>
-              <a:buSzTx/>
-              <a:buNone/>
-              <a:tabLst/>
-            </a:pPr>
-            <a:r>
-              <a:rPr kumimoji="0" lang="en-US" altLang="en-US" b="0" i="0" u="none" strike="noStrike" cap="none" normalizeH="0" baseline="0" dirty="0">
-                <a:ln>
-                  <a:noFill/>
-                </a:ln>
-                <a:solidFill>
-                  <a:schemeClr val="tx1"/>
-                </a:solidFill>
-                <a:effectLst/>
-              </a:rPr>
-              <a:t>[</a:t>
-            </a:r>
-            <a:r>
-              <a:rPr kumimoji="0" lang="tr-TR" altLang="en-US" b="0" i="0" u="none" strike="noStrike" cap="none" normalizeH="0" baseline="0" dirty="0">
-                <a:ln>
-                  <a:noFill/>
-                </a:ln>
-                <a:solidFill>
-                  <a:schemeClr val="tx1"/>
-                </a:solidFill>
-                <a:effectLst/>
-              </a:rPr>
-              <a:t>7</a:t>
-            </a:r>
-            <a:r>
-              <a:rPr kumimoji="0" lang="en-US" altLang="en-US" b="0" i="0" u="none" strike="noStrike" cap="none" normalizeH="0" baseline="0" dirty="0">
-                <a:ln>
-                  <a:noFill/>
-                </a:ln>
-                <a:solidFill>
-                  <a:schemeClr val="tx1"/>
-                </a:solidFill>
-                <a:effectLst/>
-              </a:rPr>
-              <a:t>] </a:t>
-            </a:r>
-            <a:r>
-              <a:rPr lang="en-CA" dirty="0"/>
-              <a:t>Sentinel-2 and MODIS Data Catalog.</a:t>
-            </a:r>
-            <a:endParaRPr lang="tr-TR" dirty="0"/>
-          </a:p>
-          <a:p>
-            <a:pPr marL="0" marR="0" lvl="0" indent="0" algn="l" defTabSz="914400" rtl="0" eaLnBrk="0" fontAlgn="base" latinLnBrk="0" hangingPunct="0">
-              <a:lnSpc>
-                <a:spcPct val="100000"/>
-              </a:lnSpc>
-              <a:spcBef>
-                <a:spcPct val="0"/>
-              </a:spcBef>
-              <a:spcAft>
-                <a:spcPct val="0"/>
-              </a:spcAft>
-              <a:buClrTx/>
-              <a:buSzTx/>
-              <a:buNone/>
-              <a:tabLst/>
-            </a:pPr>
-            <a:r>
-              <a:rPr kumimoji="0" lang="en-US" altLang="en-US" b="0" i="0" u="none" strike="noStrike" cap="none" normalizeH="0" baseline="0" dirty="0">
-                <a:ln>
-                  <a:noFill/>
-                </a:ln>
-                <a:solidFill>
-                  <a:schemeClr val="tx1"/>
-                </a:solidFill>
-                <a:effectLst/>
-              </a:rPr>
-              <a:t>[</a:t>
-            </a:r>
-            <a:r>
-              <a:rPr kumimoji="0" lang="tr-TR" altLang="en-US" b="0" i="0" u="none" strike="noStrike" cap="none" normalizeH="0" baseline="0" dirty="0">
-                <a:ln>
-                  <a:noFill/>
-                </a:ln>
-                <a:solidFill>
-                  <a:schemeClr val="tx1"/>
-                </a:solidFill>
-                <a:effectLst/>
-              </a:rPr>
-              <a:t>8</a:t>
-            </a:r>
-            <a:r>
-              <a:rPr kumimoji="0" lang="en-US" altLang="en-US" b="0" i="0" u="none" strike="noStrike" cap="none" normalizeH="0" baseline="0" dirty="0">
-                <a:ln>
-                  <a:noFill/>
-                </a:ln>
-                <a:solidFill>
-                  <a:schemeClr val="tx1"/>
-                </a:solidFill>
-                <a:effectLst/>
-              </a:rPr>
-              <a:t>] </a:t>
-            </a:r>
-            <a:r>
-              <a:rPr lang="en-CA" dirty="0"/>
-              <a:t>ISRIC </a:t>
-            </a:r>
-            <a:r>
-              <a:rPr lang="en-CA" noProof="1"/>
-              <a:t>SoilGrids</a:t>
-            </a:r>
-            <a:endParaRPr kumimoji="0" lang="en-CA" altLang="en-US" b="0" i="0" u="none" strike="noStrike" cap="none" normalizeH="0" baseline="0" noProof="1">
-              <a:ln>
-                <a:noFill/>
-              </a:ln>
-              <a:solidFill>
-                <a:schemeClr val="tx1"/>
-              </a:solidFill>
-              <a:effectLst/>
-            </a:endParaRPr>
-          </a:p>
-        </p:txBody>
-      </p:sp>
+      </p:pic>
     </p:spTree>
     <p:extLst>
       <p:ext uri="{BB962C8B-B14F-4D97-AF65-F5344CB8AC3E}">
-        <p14:creationId xmlns:p14="http://schemas.microsoft.com/office/powerpoint/2010/main" val="3664326242"/>
+        <p14:creationId xmlns:p14="http://schemas.microsoft.com/office/powerpoint/2010/main" val="171938458"/>
+      </p:ext>
+    </p:extLst>
+  </p:cSld>
+  <p:clrMapOvr>
+    <a:masterClrMapping/>
+  </p:clrMapOvr>
+</p:sld>
+</file>
+
+<file path=ppt/slides/slide28.xml><?xml version="1.0" encoding="utf-8"?>
+<p:sld xmlns:a="http://schemas.openxmlformats.org/drawingml/2006/main" xmlns:r="http://schemas.openxmlformats.org/officeDocument/2006/relationships" xmlns:p="http://schemas.openxmlformats.org/presentationml/2006/main">
+  <p:cSld>
+    <p:spTree>
+      <p:nvGrpSpPr>
+        <p:cNvPr id="1" name=""/>
+        <p:cNvGrpSpPr/>
+        <p:nvPr/>
+      </p:nvGrpSpPr>
+      <p:grpSpPr>
+        <a:xfrm>
+          <a:off x="0" y="0"/>
+          <a:ext cx="0" cy="0"/>
+          <a:chOff x="0" y="0"/>
+          <a:chExt cx="0" cy="0"/>
+        </a:xfrm>
+      </p:grpSpPr>
+      <p:sp>
+        <p:nvSpPr>
+          <p:cNvPr id="2" name="Başlık 1">
+            <a:extLst>
+              <a:ext uri="{FF2B5EF4-FFF2-40B4-BE49-F238E27FC236}">
+                <a16:creationId xmlns:a16="http://schemas.microsoft.com/office/drawing/2014/main" id="{1C6F0304-2D51-E471-4595-DCD5A8C7BEAB}"/>
+              </a:ext>
+            </a:extLst>
+          </p:cNvPr>
+          <p:cNvSpPr>
+            <a:spLocks noGrp="1"/>
+          </p:cNvSpPr>
+          <p:nvPr>
+            <p:ph type="title"/>
+          </p:nvPr>
+        </p:nvSpPr>
+        <p:spPr/>
+        <p:txBody>
+          <a:bodyPr>
+            <a:normAutofit/>
+          </a:bodyPr>
+          <a:lstStyle/>
+          <a:p>
+            <a:pPr algn="l"/>
+            <a:r>
+              <a:rPr lang="en-CA" b="1" i="0" dirty="0">
+                <a:solidFill>
+                  <a:srgbClr val="404040"/>
+                </a:solidFill>
+                <a:effectLst/>
+                <a:latin typeface="quote-cjk-patch"/>
+              </a:rPr>
+              <a:t>Explanation</a:t>
+            </a:r>
+            <a:r>
+              <a:rPr lang="en-CA" b="0" i="0" dirty="0">
+                <a:solidFill>
+                  <a:srgbClr val="404040"/>
+                </a:solidFill>
+                <a:effectLst/>
+                <a:latin typeface="quote-cjk-patch"/>
+              </a:rPr>
+              <a:t>:</a:t>
+            </a:r>
+            <a:endParaRPr lang="en-CA" dirty="0"/>
+          </a:p>
+        </p:txBody>
+      </p:sp>
+      <p:sp>
+        <p:nvSpPr>
+          <p:cNvPr id="3" name="İçerik Yer Tutucusu 2">
+            <a:extLst>
+              <a:ext uri="{FF2B5EF4-FFF2-40B4-BE49-F238E27FC236}">
+                <a16:creationId xmlns:a16="http://schemas.microsoft.com/office/drawing/2014/main" id="{6CBA154F-6F00-221B-D3F3-6FE44B1BF3F8}"/>
+              </a:ext>
+            </a:extLst>
+          </p:cNvPr>
+          <p:cNvSpPr>
+            <a:spLocks noGrp="1"/>
+          </p:cNvSpPr>
+          <p:nvPr>
+            <p:ph idx="1"/>
+          </p:nvPr>
+        </p:nvSpPr>
+        <p:spPr/>
+        <p:txBody>
+          <a:bodyPr/>
+          <a:lstStyle/>
+          <a:p>
+            <a:pPr algn="l">
+              <a:buFont typeface="Arial" panose="020B0604020202020204" pitchFamily="34" charset="0"/>
+              <a:buChar char="•"/>
+            </a:pPr>
+            <a:r>
+              <a:rPr lang="en-CA" b="0" i="0" dirty="0">
+                <a:solidFill>
+                  <a:srgbClr val="404040"/>
+                </a:solidFill>
+                <a:effectLst/>
+                <a:latin typeface="quote-cjk-patch"/>
+              </a:rPr>
+              <a:t>Lists the </a:t>
+            </a:r>
+            <a:r>
+              <a:rPr lang="en-CA" b="1" i="0" dirty="0">
+                <a:solidFill>
+                  <a:srgbClr val="404040"/>
+                </a:solidFill>
+                <a:effectLst/>
+                <a:latin typeface="quote-cjk-patch"/>
+              </a:rPr>
+              <a:t>15 critical input features</a:t>
+            </a:r>
+            <a:r>
+              <a:rPr lang="en-CA" b="0" i="0" dirty="0">
+                <a:solidFill>
+                  <a:srgbClr val="404040"/>
+                </a:solidFill>
+                <a:effectLst/>
+                <a:latin typeface="quote-cjk-patch"/>
+              </a:rPr>
+              <a:t> used in the machine learning model (e.g., Albedo, Slope, Soil pH, NDVI).</a:t>
+            </a:r>
+          </a:p>
+          <a:p>
+            <a:pPr algn="l">
+              <a:buFont typeface="Arial" panose="020B0604020202020204" pitchFamily="34" charset="0"/>
+              <a:buChar char="•"/>
+            </a:pPr>
+            <a:r>
+              <a:rPr lang="en-CA" b="0" i="0" dirty="0">
+                <a:solidFill>
+                  <a:srgbClr val="404040"/>
+                </a:solidFill>
+                <a:effectLst/>
+                <a:latin typeface="quote-cjk-patch"/>
+              </a:rPr>
+              <a:t>These layers were extracted from satellite imagery, soil databases, and climatic datasets in Google Earth Engine.</a:t>
+            </a:r>
+          </a:p>
+          <a:p>
+            <a:pPr algn="l">
+              <a:buFont typeface="Arial" panose="020B0604020202020204" pitchFamily="34" charset="0"/>
+              <a:buChar char="•"/>
+            </a:pPr>
+            <a:r>
+              <a:rPr lang="en-CA" b="0" i="1" dirty="0">
+                <a:solidFill>
+                  <a:srgbClr val="404040"/>
+                </a:solidFill>
+                <a:effectLst/>
+                <a:latin typeface="quote-cjk-patch"/>
+              </a:rPr>
+              <a:t>Example</a:t>
+            </a:r>
+            <a:r>
+              <a:rPr lang="en-CA" b="0" i="0" dirty="0">
+                <a:solidFill>
+                  <a:srgbClr val="404040"/>
+                </a:solidFill>
+                <a:effectLst/>
+                <a:latin typeface="quote-cjk-patch"/>
+              </a:rPr>
+              <a:t>: "</a:t>
+            </a:r>
+            <a:r>
+              <a:rPr lang="en-CA" b="0" i="0" dirty="0" err="1">
+                <a:solidFill>
+                  <a:srgbClr val="404040"/>
+                </a:solidFill>
+                <a:effectLst/>
+                <a:latin typeface="quote-cjk-patch"/>
+              </a:rPr>
+              <a:t>Clay_Content</a:t>
+            </a:r>
+            <a:r>
+              <a:rPr lang="en-CA" b="0" i="0" dirty="0">
+                <a:solidFill>
+                  <a:srgbClr val="404040"/>
+                </a:solidFill>
+                <a:effectLst/>
+                <a:latin typeface="quote-cjk-patch"/>
+              </a:rPr>
+              <a:t>" and "</a:t>
+            </a:r>
+            <a:r>
+              <a:rPr lang="en-CA" b="0" i="0" dirty="0" err="1">
+                <a:solidFill>
+                  <a:srgbClr val="404040"/>
+                </a:solidFill>
+                <a:effectLst/>
+                <a:latin typeface="quote-cjk-patch"/>
+              </a:rPr>
+              <a:t>Annual_Temperature</a:t>
+            </a:r>
+            <a:r>
+              <a:rPr lang="en-CA" b="0" i="0" dirty="0">
+                <a:solidFill>
+                  <a:srgbClr val="404040"/>
+                </a:solidFill>
+                <a:effectLst/>
+                <a:latin typeface="quote-cjk-patch"/>
+              </a:rPr>
+              <a:t>" directly influence greenhouse banana suitability in Antalya.</a:t>
+            </a:r>
+          </a:p>
+          <a:p>
+            <a:endParaRPr lang="en-CA" dirty="0"/>
+          </a:p>
+        </p:txBody>
+      </p:sp>
+    </p:spTree>
+    <p:extLst>
+      <p:ext uri="{BB962C8B-B14F-4D97-AF65-F5344CB8AC3E}">
+        <p14:creationId xmlns:p14="http://schemas.microsoft.com/office/powerpoint/2010/main" val="3004650273"/>
+      </p:ext>
+    </p:extLst>
+  </p:cSld>
+  <p:clrMapOvr>
+    <a:masterClrMapping/>
+  </p:clrMapOvr>
+</p:sld>
+</file>
+
+<file path=ppt/slides/slide29.xml><?xml version="1.0" encoding="utf-8"?>
+<p:sld xmlns:a="http://schemas.openxmlformats.org/drawingml/2006/main" xmlns:r="http://schemas.openxmlformats.org/officeDocument/2006/relationships" xmlns:p="http://schemas.openxmlformats.org/presentationml/2006/main">
+  <p:cSld>
+    <p:spTree>
+      <p:nvGrpSpPr>
+        <p:cNvPr id="1" name=""/>
+        <p:cNvGrpSpPr/>
+        <p:nvPr/>
+      </p:nvGrpSpPr>
+      <p:grpSpPr>
+        <a:xfrm>
+          <a:off x="0" y="0"/>
+          <a:ext cx="0" cy="0"/>
+          <a:chOff x="0" y="0"/>
+          <a:chExt cx="0" cy="0"/>
+        </a:xfrm>
+      </p:grpSpPr>
+      <p:sp>
+        <p:nvSpPr>
+          <p:cNvPr id="2" name="Başlık 1">
+            <a:extLst>
+              <a:ext uri="{FF2B5EF4-FFF2-40B4-BE49-F238E27FC236}">
+                <a16:creationId xmlns:a16="http://schemas.microsoft.com/office/drawing/2014/main" id="{4B02E23F-010B-7F37-0491-615E9E2BF638}"/>
+              </a:ext>
+            </a:extLst>
+          </p:cNvPr>
+          <p:cNvSpPr>
+            <a:spLocks noGrp="1"/>
+          </p:cNvSpPr>
+          <p:nvPr>
+            <p:ph type="title"/>
+          </p:nvPr>
+        </p:nvSpPr>
+        <p:spPr/>
+        <p:txBody>
+          <a:bodyPr/>
+          <a:lstStyle/>
+          <a:p>
+            <a:r>
+              <a:rPr lang="en-CA" b="0" i="1" dirty="0">
+                <a:solidFill>
+                  <a:srgbClr val="404040"/>
+                </a:solidFill>
+                <a:effectLst/>
+                <a:latin typeface="quote-cjk-patch"/>
+              </a:rPr>
+              <a:t>Reclassified Suitability Layers (Antalya)</a:t>
+            </a:r>
+            <a:endParaRPr lang="en-CA" dirty="0"/>
+          </a:p>
+        </p:txBody>
+      </p:sp>
+      <p:pic>
+        <p:nvPicPr>
+          <p:cNvPr id="5" name="İçerik Yer Tutucusu 4" descr="metin, harita, ekran görüntüsü içeren bir resim&#10;&#10;Yapay zeka tarafından oluşturulan içerik yanlış olabilir.">
+            <a:extLst>
+              <a:ext uri="{FF2B5EF4-FFF2-40B4-BE49-F238E27FC236}">
+                <a16:creationId xmlns:a16="http://schemas.microsoft.com/office/drawing/2014/main" id="{F4E1B141-6FCE-7AAC-1AD5-09672CD8F17B}"/>
+              </a:ext>
+            </a:extLst>
+          </p:cNvPr>
+          <p:cNvPicPr>
+            <a:picLocks noGrp="1" noChangeAspect="1"/>
+          </p:cNvPicPr>
+          <p:nvPr>
+            <p:ph idx="1"/>
+          </p:nvPr>
+        </p:nvPicPr>
+        <p:blipFill>
+          <a:blip r:embed="rId2">
+            <a:extLst>
+              <a:ext uri="{28A0092B-C50C-407E-A947-70E740481C1C}">
+                <a14:useLocalDpi xmlns:a14="http://schemas.microsoft.com/office/drawing/2010/main" val="0"/>
+              </a:ext>
+            </a:extLst>
+          </a:blip>
+          <a:stretch>
+            <a:fillRect/>
+          </a:stretch>
+        </p:blipFill>
+        <p:spPr>
+          <a:xfrm>
+            <a:off x="1487607" y="2557463"/>
+            <a:ext cx="9089408" cy="3317875"/>
+          </a:xfrm>
+        </p:spPr>
+      </p:pic>
+    </p:spTree>
+    <p:extLst>
+      <p:ext uri="{BB962C8B-B14F-4D97-AF65-F5344CB8AC3E}">
+        <p14:creationId xmlns:p14="http://schemas.microsoft.com/office/powerpoint/2010/main" val="286291008"/>
       </p:ext>
     </p:extLst>
   </p:cSld>
@@ -10332,6 +10969,1201 @@
     <p:extLst>
       <p:ext uri="{BB962C8B-B14F-4D97-AF65-F5344CB8AC3E}">
         <p14:creationId xmlns:p14="http://schemas.microsoft.com/office/powerpoint/2010/main" val="156013411"/>
+      </p:ext>
+    </p:extLst>
+  </p:cSld>
+  <p:clrMapOvr>
+    <a:masterClrMapping/>
+  </p:clrMapOvr>
+</p:sld>
+</file>
+
+<file path=ppt/slides/slide30.xml><?xml version="1.0" encoding="utf-8"?>
+<p:sld xmlns:a="http://schemas.openxmlformats.org/drawingml/2006/main" xmlns:r="http://schemas.openxmlformats.org/officeDocument/2006/relationships" xmlns:p="http://schemas.openxmlformats.org/presentationml/2006/main">
+  <p:cSld>
+    <p:spTree>
+      <p:nvGrpSpPr>
+        <p:cNvPr id="1" name=""/>
+        <p:cNvGrpSpPr/>
+        <p:nvPr/>
+      </p:nvGrpSpPr>
+      <p:grpSpPr>
+        <a:xfrm>
+          <a:off x="0" y="0"/>
+          <a:ext cx="0" cy="0"/>
+          <a:chOff x="0" y="0"/>
+          <a:chExt cx="0" cy="0"/>
+        </a:xfrm>
+      </p:grpSpPr>
+      <p:sp>
+        <p:nvSpPr>
+          <p:cNvPr id="2" name="Başlık 1">
+            <a:extLst>
+              <a:ext uri="{FF2B5EF4-FFF2-40B4-BE49-F238E27FC236}">
+                <a16:creationId xmlns:a16="http://schemas.microsoft.com/office/drawing/2014/main" id="{15616A6B-6817-F36D-8CDA-CA4BC507DC52}"/>
+              </a:ext>
+            </a:extLst>
+          </p:cNvPr>
+          <p:cNvSpPr>
+            <a:spLocks noGrp="1"/>
+          </p:cNvSpPr>
+          <p:nvPr>
+            <p:ph type="title"/>
+          </p:nvPr>
+        </p:nvSpPr>
+        <p:spPr/>
+        <p:txBody>
+          <a:bodyPr>
+            <a:normAutofit/>
+          </a:bodyPr>
+          <a:lstStyle/>
+          <a:p>
+            <a:pPr algn="l"/>
+            <a:r>
+              <a:rPr lang="en-CA" b="1" i="0" dirty="0">
+                <a:solidFill>
+                  <a:srgbClr val="404040"/>
+                </a:solidFill>
+                <a:effectLst/>
+                <a:latin typeface="quote-cjk-patch"/>
+              </a:rPr>
+              <a:t>Explanation</a:t>
+            </a:r>
+            <a:r>
+              <a:rPr lang="en-CA" b="0" i="0" dirty="0">
+                <a:solidFill>
+                  <a:srgbClr val="404040"/>
+                </a:solidFill>
+                <a:effectLst/>
+                <a:latin typeface="quote-cjk-patch"/>
+              </a:rPr>
+              <a:t>:</a:t>
+            </a:r>
+            <a:endParaRPr lang="en-CA" dirty="0"/>
+          </a:p>
+        </p:txBody>
+      </p:sp>
+      <p:sp>
+        <p:nvSpPr>
+          <p:cNvPr id="3" name="İçerik Yer Tutucusu 2">
+            <a:extLst>
+              <a:ext uri="{FF2B5EF4-FFF2-40B4-BE49-F238E27FC236}">
+                <a16:creationId xmlns:a16="http://schemas.microsoft.com/office/drawing/2014/main" id="{F5F30F01-444D-88AC-7650-671AEBCC7119}"/>
+              </a:ext>
+            </a:extLst>
+          </p:cNvPr>
+          <p:cNvSpPr>
+            <a:spLocks noGrp="1"/>
+          </p:cNvSpPr>
+          <p:nvPr>
+            <p:ph idx="1"/>
+          </p:nvPr>
+        </p:nvSpPr>
+        <p:spPr/>
+        <p:txBody>
+          <a:bodyPr>
+            <a:normAutofit lnSpcReduction="10000"/>
+          </a:bodyPr>
+          <a:lstStyle/>
+          <a:p>
+            <a:pPr algn="l">
+              <a:buFont typeface="Arial" panose="020B0604020202020204" pitchFamily="34" charset="0"/>
+              <a:buChar char="•"/>
+            </a:pPr>
+            <a:r>
+              <a:rPr lang="en-CA" b="0" i="0" dirty="0">
+                <a:solidFill>
+                  <a:srgbClr val="404040"/>
+                </a:solidFill>
+                <a:effectLst/>
+                <a:latin typeface="quote-cjk-patch"/>
+              </a:rPr>
+              <a:t>Shows </a:t>
+            </a:r>
+            <a:r>
+              <a:rPr lang="en-CA" b="1" i="0" dirty="0">
+                <a:solidFill>
+                  <a:srgbClr val="404040"/>
+                </a:solidFill>
+                <a:effectLst/>
+                <a:latin typeface="quote-cjk-patch"/>
+              </a:rPr>
+              <a:t>reclassified raster layers</a:t>
+            </a:r>
+            <a:r>
+              <a:rPr lang="en-CA" b="0" i="0" dirty="0">
+                <a:solidFill>
+                  <a:srgbClr val="404040"/>
+                </a:solidFill>
+                <a:effectLst/>
+                <a:latin typeface="quote-cjk-patch"/>
+              </a:rPr>
+              <a:t> (e.g., </a:t>
+            </a:r>
+            <a:r>
+              <a:rPr lang="en-CA" b="0" i="0" dirty="0" err="1">
+                <a:solidFill>
+                  <a:srgbClr val="404040"/>
+                </a:solidFill>
+                <a:effectLst/>
+                <a:latin typeface="quote-cjk-patch"/>
+              </a:rPr>
+              <a:t>Rec_NDVI</a:t>
+            </a:r>
+            <a:r>
+              <a:rPr lang="en-CA" b="0" i="0" dirty="0">
+                <a:solidFill>
+                  <a:srgbClr val="404040"/>
+                </a:solidFill>
+                <a:effectLst/>
+                <a:latin typeface="quote-cjk-patch"/>
+              </a:rPr>
+              <a:t>, </a:t>
+            </a:r>
+            <a:r>
+              <a:rPr lang="en-CA" b="0" i="0" dirty="0" err="1">
+                <a:solidFill>
+                  <a:srgbClr val="404040"/>
+                </a:solidFill>
+                <a:effectLst/>
+                <a:latin typeface="quote-cjk-patch"/>
+              </a:rPr>
+              <a:t>Rec_Soil_pH</a:t>
+            </a:r>
+            <a:r>
+              <a:rPr lang="en-CA" b="0" i="0" dirty="0">
+                <a:solidFill>
+                  <a:srgbClr val="404040"/>
+                </a:solidFill>
+                <a:effectLst/>
+                <a:latin typeface="quote-cjk-patch"/>
+              </a:rPr>
+              <a:t>) after normalization for multi-criteria analysis.</a:t>
+            </a:r>
+          </a:p>
+          <a:p>
+            <a:pPr algn="l">
+              <a:buFont typeface="Arial" panose="020B0604020202020204" pitchFamily="34" charset="0"/>
+              <a:buChar char="•"/>
+            </a:pPr>
+            <a:r>
+              <a:rPr lang="en-CA" b="0" i="0" dirty="0">
+                <a:solidFill>
+                  <a:srgbClr val="404040"/>
+                </a:solidFill>
+                <a:effectLst/>
+                <a:latin typeface="quote-cjk-patch"/>
+              </a:rPr>
+              <a:t>Highlights how raw data (e.g., Precipitation) was transformed into standardized suitability scores (0–1).</a:t>
+            </a:r>
+          </a:p>
+          <a:p>
+            <a:pPr algn="l">
+              <a:buFont typeface="Arial" panose="020B0604020202020204" pitchFamily="34" charset="0"/>
+              <a:buChar char="•"/>
+            </a:pPr>
+            <a:r>
+              <a:rPr lang="en-CA" b="0" i="1" dirty="0">
+                <a:solidFill>
+                  <a:srgbClr val="404040"/>
+                </a:solidFill>
+                <a:effectLst/>
+                <a:latin typeface="quote-cjk-patch"/>
+              </a:rPr>
+              <a:t>Key Insight</a:t>
+            </a:r>
+            <a:r>
+              <a:rPr lang="en-CA" b="0" i="0" dirty="0">
+                <a:solidFill>
+                  <a:srgbClr val="404040"/>
+                </a:solidFill>
+                <a:effectLst/>
+                <a:latin typeface="quote-cjk-patch"/>
+              </a:rPr>
+              <a:t>: The final "Suitability" layer combines these reclassified inputs for ML predictions.</a:t>
+            </a:r>
+          </a:p>
+          <a:p>
+            <a:pPr marL="0" indent="0">
+              <a:buNone/>
+            </a:pPr>
+            <a:br>
+              <a:rPr lang="en-CA" dirty="0"/>
+            </a:br>
+            <a:endParaRPr lang="en-CA" dirty="0"/>
+          </a:p>
+        </p:txBody>
+      </p:sp>
+    </p:spTree>
+    <p:extLst>
+      <p:ext uri="{BB962C8B-B14F-4D97-AF65-F5344CB8AC3E}">
+        <p14:creationId xmlns:p14="http://schemas.microsoft.com/office/powerpoint/2010/main" val="460875036"/>
+      </p:ext>
+    </p:extLst>
+  </p:cSld>
+  <p:clrMapOvr>
+    <a:masterClrMapping/>
+  </p:clrMapOvr>
+</p:sld>
+</file>
+
+<file path=ppt/slides/slide31.xml><?xml version="1.0" encoding="utf-8"?>
+<p:sld xmlns:a="http://schemas.openxmlformats.org/drawingml/2006/main" xmlns:r="http://schemas.openxmlformats.org/officeDocument/2006/relationships" xmlns:p="http://schemas.openxmlformats.org/presentationml/2006/main">
+  <p:cSld>
+    <p:spTree>
+      <p:nvGrpSpPr>
+        <p:cNvPr id="1" name=""/>
+        <p:cNvGrpSpPr/>
+        <p:nvPr/>
+      </p:nvGrpSpPr>
+      <p:grpSpPr>
+        <a:xfrm>
+          <a:off x="0" y="0"/>
+          <a:ext cx="0" cy="0"/>
+          <a:chOff x="0" y="0"/>
+          <a:chExt cx="0" cy="0"/>
+        </a:xfrm>
+      </p:grpSpPr>
+      <p:sp>
+        <p:nvSpPr>
+          <p:cNvPr id="2" name="Başlık 1">
+            <a:extLst>
+              <a:ext uri="{FF2B5EF4-FFF2-40B4-BE49-F238E27FC236}">
+                <a16:creationId xmlns:a16="http://schemas.microsoft.com/office/drawing/2014/main" id="{CF01CD09-3279-F2E4-B172-5D4C8B933C34}"/>
+              </a:ext>
+            </a:extLst>
+          </p:cNvPr>
+          <p:cNvSpPr>
+            <a:spLocks noGrp="1"/>
+          </p:cNvSpPr>
+          <p:nvPr>
+            <p:ph type="title"/>
+          </p:nvPr>
+        </p:nvSpPr>
+        <p:spPr/>
+        <p:txBody>
+          <a:bodyPr/>
+          <a:lstStyle/>
+          <a:p>
+            <a:r>
+              <a:rPr lang="en-CA" b="0" i="1" dirty="0">
+                <a:solidFill>
+                  <a:srgbClr val="404040"/>
+                </a:solidFill>
+                <a:effectLst/>
+                <a:latin typeface="quote-cjk-patch"/>
+              </a:rPr>
+              <a:t>Model Performance Metrics</a:t>
+            </a:r>
+            <a:endParaRPr lang="en-CA" dirty="0"/>
+          </a:p>
+        </p:txBody>
+      </p:sp>
+      <p:pic>
+        <p:nvPicPr>
+          <p:cNvPr id="5" name="İçerik Yer Tutucusu 4" descr="metin, diyagram, ekran görüntüsü, plan içeren bir resim&#10;&#10;Yapay zeka tarafından oluşturulan içerik yanlış olabilir.">
+            <a:extLst>
+              <a:ext uri="{FF2B5EF4-FFF2-40B4-BE49-F238E27FC236}">
+                <a16:creationId xmlns:a16="http://schemas.microsoft.com/office/drawing/2014/main" id="{5138C817-3C3D-480B-7677-525907EB6C9C}"/>
+              </a:ext>
+            </a:extLst>
+          </p:cNvPr>
+          <p:cNvPicPr>
+            <a:picLocks noGrp="1" noChangeAspect="1"/>
+          </p:cNvPicPr>
+          <p:nvPr>
+            <p:ph idx="1"/>
+          </p:nvPr>
+        </p:nvPicPr>
+        <p:blipFill>
+          <a:blip r:embed="rId2">
+            <a:extLst>
+              <a:ext uri="{28A0092B-C50C-407E-A947-70E740481C1C}">
+                <a14:useLocalDpi xmlns:a14="http://schemas.microsoft.com/office/drawing/2010/main" val="0"/>
+              </a:ext>
+            </a:extLst>
+          </a:blip>
+          <a:stretch>
+            <a:fillRect/>
+          </a:stretch>
+        </p:blipFill>
+        <p:spPr>
+          <a:xfrm>
+            <a:off x="1295403" y="2557463"/>
+            <a:ext cx="9601196" cy="3317875"/>
+          </a:xfrm>
+        </p:spPr>
+      </p:pic>
+    </p:spTree>
+    <p:extLst>
+      <p:ext uri="{BB962C8B-B14F-4D97-AF65-F5344CB8AC3E}">
+        <p14:creationId xmlns:p14="http://schemas.microsoft.com/office/powerpoint/2010/main" val="1416816608"/>
+      </p:ext>
+    </p:extLst>
+  </p:cSld>
+  <p:clrMapOvr>
+    <a:masterClrMapping/>
+  </p:clrMapOvr>
+</p:sld>
+</file>
+
+<file path=ppt/slides/slide32.xml><?xml version="1.0" encoding="utf-8"?>
+<p:sld xmlns:a="http://schemas.openxmlformats.org/drawingml/2006/main" xmlns:r="http://schemas.openxmlformats.org/officeDocument/2006/relationships" xmlns:p="http://schemas.openxmlformats.org/presentationml/2006/main">
+  <p:cSld>
+    <p:spTree>
+      <p:nvGrpSpPr>
+        <p:cNvPr id="1" name=""/>
+        <p:cNvGrpSpPr/>
+        <p:nvPr/>
+      </p:nvGrpSpPr>
+      <p:grpSpPr>
+        <a:xfrm>
+          <a:off x="0" y="0"/>
+          <a:ext cx="0" cy="0"/>
+          <a:chOff x="0" y="0"/>
+          <a:chExt cx="0" cy="0"/>
+        </a:xfrm>
+      </p:grpSpPr>
+      <p:sp>
+        <p:nvSpPr>
+          <p:cNvPr id="2" name="Başlık 1">
+            <a:extLst>
+              <a:ext uri="{FF2B5EF4-FFF2-40B4-BE49-F238E27FC236}">
+                <a16:creationId xmlns:a16="http://schemas.microsoft.com/office/drawing/2014/main" id="{94E0EEB7-E49F-B5F2-4FAC-2459CF990CB2}"/>
+              </a:ext>
+            </a:extLst>
+          </p:cNvPr>
+          <p:cNvSpPr>
+            <a:spLocks noGrp="1"/>
+          </p:cNvSpPr>
+          <p:nvPr>
+            <p:ph type="title"/>
+          </p:nvPr>
+        </p:nvSpPr>
+        <p:spPr/>
+        <p:txBody>
+          <a:bodyPr>
+            <a:normAutofit/>
+          </a:bodyPr>
+          <a:lstStyle/>
+          <a:p>
+            <a:pPr algn="l"/>
+            <a:r>
+              <a:rPr lang="en-CA" b="1" i="0" dirty="0">
+                <a:solidFill>
+                  <a:srgbClr val="404040"/>
+                </a:solidFill>
+                <a:effectLst/>
+                <a:latin typeface="quote-cjk-patch"/>
+              </a:rPr>
+              <a:t>Explanation</a:t>
+            </a:r>
+            <a:r>
+              <a:rPr lang="en-CA" b="0" i="0" dirty="0">
+                <a:solidFill>
+                  <a:srgbClr val="404040"/>
+                </a:solidFill>
+                <a:effectLst/>
+                <a:latin typeface="quote-cjk-patch"/>
+              </a:rPr>
+              <a:t>:</a:t>
+            </a:r>
+            <a:endParaRPr lang="en-CA" dirty="0"/>
+          </a:p>
+        </p:txBody>
+      </p:sp>
+      <p:sp>
+        <p:nvSpPr>
+          <p:cNvPr id="3" name="İçerik Yer Tutucusu 2">
+            <a:extLst>
+              <a:ext uri="{FF2B5EF4-FFF2-40B4-BE49-F238E27FC236}">
+                <a16:creationId xmlns:a16="http://schemas.microsoft.com/office/drawing/2014/main" id="{12617BE3-B238-FF4A-2097-202AA4A0CF4B}"/>
+              </a:ext>
+            </a:extLst>
+          </p:cNvPr>
+          <p:cNvSpPr>
+            <a:spLocks noGrp="1"/>
+          </p:cNvSpPr>
+          <p:nvPr>
+            <p:ph idx="1"/>
+          </p:nvPr>
+        </p:nvSpPr>
+        <p:spPr/>
+        <p:txBody>
+          <a:bodyPr>
+            <a:normAutofit lnSpcReduction="10000"/>
+          </a:bodyPr>
+          <a:lstStyle/>
+          <a:p>
+            <a:pPr algn="l">
+              <a:buFont typeface="Arial" panose="020B0604020202020204" pitchFamily="34" charset="0"/>
+              <a:buChar char="•"/>
+            </a:pPr>
+            <a:r>
+              <a:rPr lang="en-CA" b="0" i="0" dirty="0">
+                <a:solidFill>
+                  <a:srgbClr val="404040"/>
+                </a:solidFill>
+                <a:effectLst/>
+                <a:latin typeface="quote-cjk-patch"/>
+              </a:rPr>
+              <a:t>Compares </a:t>
+            </a:r>
+            <a:r>
+              <a:rPr lang="en-CA" b="1" i="0" dirty="0">
+                <a:solidFill>
+                  <a:srgbClr val="404040"/>
+                </a:solidFill>
+                <a:effectLst/>
+                <a:latin typeface="quote-cjk-patch"/>
+              </a:rPr>
+              <a:t>global baselines vs. model predictions</a:t>
+            </a:r>
+            <a:r>
+              <a:rPr lang="en-CA" b="0" i="0" dirty="0">
+                <a:solidFill>
+                  <a:srgbClr val="404040"/>
+                </a:solidFill>
+                <a:effectLst/>
+                <a:latin typeface="quote-cjk-patch"/>
+              </a:rPr>
+              <a:t> (likely </a:t>
+            </a:r>
+            <a:r>
+              <a:rPr lang="en-CA" b="0" i="0" dirty="0" err="1">
+                <a:solidFill>
+                  <a:srgbClr val="404040"/>
+                </a:solidFill>
+                <a:effectLst/>
+                <a:latin typeface="quote-cjk-patch"/>
+              </a:rPr>
+              <a:t>XGBoost</a:t>
+            </a:r>
+            <a:r>
+              <a:rPr lang="en-CA" b="0" i="0" dirty="0">
+                <a:solidFill>
+                  <a:srgbClr val="404040"/>
+                </a:solidFill>
+                <a:effectLst/>
+                <a:latin typeface="quote-cjk-patch"/>
+              </a:rPr>
+              <a:t>, given the project’s results).</a:t>
+            </a:r>
+          </a:p>
+          <a:p>
+            <a:pPr algn="l">
+              <a:buFont typeface="Arial" panose="020B0604020202020204" pitchFamily="34" charset="0"/>
+              <a:buChar char="•"/>
+            </a:pPr>
+            <a:r>
+              <a:rPr lang="en-CA" b="0" i="0" dirty="0">
+                <a:solidFill>
+                  <a:srgbClr val="404040"/>
+                </a:solidFill>
+                <a:effectLst/>
+                <a:latin typeface="quote-cjk-patch"/>
+              </a:rPr>
+              <a:t>Validates the model’s accuracy in distinguishing suitable (1) vs. non-suitable (0) zones for greenhouse bananas.</a:t>
+            </a:r>
+          </a:p>
+          <a:p>
+            <a:pPr algn="l">
+              <a:buFont typeface="Arial" panose="020B0604020202020204" pitchFamily="34" charset="0"/>
+              <a:buChar char="•"/>
+            </a:pPr>
+            <a:r>
+              <a:rPr lang="en-CA" b="0" i="1" dirty="0">
+                <a:solidFill>
+                  <a:srgbClr val="404040"/>
+                </a:solidFill>
+                <a:effectLst/>
+                <a:latin typeface="quote-cjk-patch"/>
+              </a:rPr>
+              <a:t>Note</a:t>
+            </a:r>
+            <a:r>
+              <a:rPr lang="en-CA" b="0" i="0" dirty="0">
+                <a:solidFill>
+                  <a:srgbClr val="404040"/>
+                </a:solidFill>
+                <a:effectLst/>
+                <a:latin typeface="quote-cjk-patch"/>
+              </a:rPr>
+              <a:t>: Metrics like AUC (~0.985) align with findings in Section 5.3 of the report.</a:t>
+            </a:r>
+          </a:p>
+          <a:p>
+            <a:pPr marL="0" indent="0">
+              <a:buNone/>
+            </a:pPr>
+            <a:br>
+              <a:rPr lang="en-CA" dirty="0"/>
+            </a:br>
+            <a:endParaRPr lang="en-CA" dirty="0"/>
+          </a:p>
+        </p:txBody>
+      </p:sp>
+    </p:spTree>
+    <p:extLst>
+      <p:ext uri="{BB962C8B-B14F-4D97-AF65-F5344CB8AC3E}">
+        <p14:creationId xmlns:p14="http://schemas.microsoft.com/office/powerpoint/2010/main" val="3752406524"/>
+      </p:ext>
+    </p:extLst>
+  </p:cSld>
+  <p:clrMapOvr>
+    <a:masterClrMapping/>
+  </p:clrMapOvr>
+</p:sld>
+</file>
+
+<file path=ppt/slides/slide33.xml><?xml version="1.0" encoding="utf-8"?>
+<p:sld xmlns:a="http://schemas.openxmlformats.org/drawingml/2006/main" xmlns:r="http://schemas.openxmlformats.org/officeDocument/2006/relationships" xmlns:p="http://schemas.openxmlformats.org/presentationml/2006/main">
+  <p:cSld>
+    <p:spTree>
+      <p:nvGrpSpPr>
+        <p:cNvPr id="1" name=""/>
+        <p:cNvGrpSpPr/>
+        <p:nvPr/>
+      </p:nvGrpSpPr>
+      <p:grpSpPr>
+        <a:xfrm>
+          <a:off x="0" y="0"/>
+          <a:ext cx="0" cy="0"/>
+          <a:chOff x="0" y="0"/>
+          <a:chExt cx="0" cy="0"/>
+        </a:xfrm>
+      </p:grpSpPr>
+      <p:sp>
+        <p:nvSpPr>
+          <p:cNvPr id="2" name="Başlık 1">
+            <a:extLst>
+              <a:ext uri="{FF2B5EF4-FFF2-40B4-BE49-F238E27FC236}">
+                <a16:creationId xmlns:a16="http://schemas.microsoft.com/office/drawing/2014/main" id="{FD4E8CB5-A9C5-B343-E656-C18CCFF78147}"/>
+              </a:ext>
+            </a:extLst>
+          </p:cNvPr>
+          <p:cNvSpPr>
+            <a:spLocks noGrp="1"/>
+          </p:cNvSpPr>
+          <p:nvPr>
+            <p:ph type="title"/>
+          </p:nvPr>
+        </p:nvSpPr>
+        <p:spPr/>
+        <p:txBody>
+          <a:bodyPr/>
+          <a:lstStyle/>
+          <a:p>
+            <a:pPr algn="ctr"/>
+            <a:r>
+              <a:rPr lang="en-CA" b="1" dirty="0"/>
+              <a:t>1</a:t>
+            </a:r>
+            <a:r>
+              <a:rPr lang="tr-TR" b="1" dirty="0"/>
+              <a:t>1</a:t>
+            </a:r>
+            <a:r>
+              <a:rPr lang="en-CA" b="1" dirty="0"/>
+              <a:t>. References</a:t>
+            </a:r>
+            <a:endParaRPr lang="en-CA" dirty="0"/>
+          </a:p>
+        </p:txBody>
+      </p:sp>
+      <p:sp>
+        <p:nvSpPr>
+          <p:cNvPr id="4" name="Rectangle 1">
+            <a:extLst>
+              <a:ext uri="{FF2B5EF4-FFF2-40B4-BE49-F238E27FC236}">
+                <a16:creationId xmlns:a16="http://schemas.microsoft.com/office/drawing/2014/main" id="{55FC86D2-0D8F-B9EF-CFD9-DE4A1BFEBA08}"/>
+              </a:ext>
+            </a:extLst>
+          </p:cNvPr>
+          <p:cNvSpPr>
+            <a:spLocks noGrp="1" noChangeArrowheads="1"/>
+          </p:cNvSpPr>
+          <p:nvPr>
+            <p:ph idx="1"/>
+          </p:nvPr>
+        </p:nvSpPr>
+        <p:spPr bwMode="auto">
+          <a:xfrm>
+            <a:off x="1633929" y="2459548"/>
+            <a:ext cx="8169639" cy="3416320"/>
+          </a:xfrm>
+          <a:prstGeom prst="rect">
+            <a:avLst/>
+          </a:prstGeom>
+          <a:noFill/>
+          <a:ln>
+            <a:noFill/>
+          </a:ln>
+          <a:effectLst/>
+          <a:extLst>
+            <a:ext uri="{909E8E84-426E-40DD-AFC4-6F175D3DCCD1}">
+              <a14:hiddenFill xmlns:a14="http://schemas.microsoft.com/office/drawing/2010/main">
+                <a:solidFill>
+                  <a:schemeClr val="accent1"/>
+                </a:solidFill>
+              </a14:hiddenFill>
+            </a:ext>
+            <a:ext uri="{91240B29-F687-4F45-9708-019B960494DF}">
+              <a14:hiddenLine xmlns:a14="http://schemas.microsoft.com/office/drawing/2010/main" w="9525">
+                <a:solidFill>
+                  <a:schemeClr val="tx1"/>
+                </a:solidFill>
+                <a:miter lim="800000"/>
+                <a:headEnd/>
+                <a:tailEnd/>
+              </a14:hiddenLine>
+            </a:ext>
+            <a:ext uri="{AF507438-7753-43E0-B8FC-AC1667EBCBE1}">
+              <a14:hiddenEffects xmlns:a14="http://schemas.microsoft.com/office/drawing/2010/main">
+                <a:effectLst>
+                  <a:outerShdw dist="35921" dir="2700000" algn="ctr" rotWithShape="0">
+                    <a:schemeClr val="bg2"/>
+                  </a:outerShdw>
+                </a:effectLst>
+              </a14:hiddenEffects>
+            </a:ext>
+          </a:extLst>
+        </p:spPr>
+        <p:txBody>
+          <a:bodyPr vert="horz" wrap="square" lIns="91440" tIns="45720" rIns="91440" bIns="45720" numCol="1" anchor="ctr" anchorCtr="0" compatLnSpc="1">
+            <a:prstTxWarp prst="textNoShape">
+              <a:avLst/>
+            </a:prstTxWarp>
+            <a:spAutoFit/>
+          </a:bodyPr>
+          <a:lstStyle/>
+          <a:p>
+            <a:pPr marL="0" marR="0" lvl="0" indent="0" algn="l" defTabSz="914400" rtl="0" eaLnBrk="0" fontAlgn="base" latinLnBrk="0" hangingPunct="0">
+              <a:lnSpc>
+                <a:spcPct val="100000"/>
+              </a:lnSpc>
+              <a:spcBef>
+                <a:spcPct val="0"/>
+              </a:spcBef>
+              <a:spcAft>
+                <a:spcPct val="0"/>
+              </a:spcAft>
+              <a:buClrTx/>
+              <a:buSzTx/>
+              <a:buNone/>
+              <a:tabLst/>
+            </a:pPr>
+            <a:r>
+              <a:rPr kumimoji="0" lang="en-US" altLang="en-US" b="0" i="0" u="none" strike="noStrike" cap="none" normalizeH="0" baseline="0" dirty="0">
+                <a:ln>
+                  <a:noFill/>
+                </a:ln>
+                <a:solidFill>
+                  <a:schemeClr val="tx1"/>
+                </a:solidFill>
+                <a:effectLst/>
+              </a:rPr>
+              <a:t>[1] Google Earth Engine. </a:t>
+            </a:r>
+            <a:r>
+              <a:rPr kumimoji="0" lang="en-US" altLang="en-US" b="0" i="0" u="none" strike="noStrike" cap="none" normalizeH="0" baseline="0" dirty="0">
+                <a:ln>
+                  <a:noFill/>
+                </a:ln>
+                <a:solidFill>
+                  <a:schemeClr val="tx1"/>
+                </a:solidFill>
+                <a:effectLst/>
+                <a:hlinkClick r:id="rId2"/>
+              </a:rPr>
+              <a:t>https://earthengine.google.com/</a:t>
+            </a:r>
+            <a:endParaRPr kumimoji="0" lang="en-US" altLang="en-US" b="0" i="0" u="none" strike="noStrike" cap="none" normalizeH="0" baseline="0" dirty="0">
+              <a:ln>
+                <a:noFill/>
+              </a:ln>
+              <a:solidFill>
+                <a:schemeClr val="tx1"/>
+              </a:solidFill>
+              <a:effectLst/>
+            </a:endParaRPr>
+          </a:p>
+          <a:p>
+            <a:pPr marL="0" marR="0" lvl="0" indent="0" algn="l" defTabSz="914400" rtl="0" eaLnBrk="0" fontAlgn="base" latinLnBrk="0" hangingPunct="0">
+              <a:lnSpc>
+                <a:spcPct val="100000"/>
+              </a:lnSpc>
+              <a:spcBef>
+                <a:spcPct val="0"/>
+              </a:spcBef>
+              <a:spcAft>
+                <a:spcPct val="0"/>
+              </a:spcAft>
+              <a:buClrTx/>
+              <a:buSzTx/>
+              <a:buNone/>
+              <a:tabLst/>
+            </a:pPr>
+            <a:r>
+              <a:rPr kumimoji="0" lang="en-US" altLang="en-US" b="0" i="0" u="none" strike="noStrike" cap="none" normalizeH="0" baseline="0" dirty="0">
+                <a:ln>
+                  <a:noFill/>
+                </a:ln>
+                <a:solidFill>
+                  <a:schemeClr val="tx1"/>
+                </a:solidFill>
+                <a:effectLst/>
+              </a:rPr>
+              <a:t>[2] FAO Soil Data. </a:t>
+            </a:r>
+            <a:r>
+              <a:rPr kumimoji="0" lang="en-US" altLang="en-US" b="0" i="0" u="none" strike="noStrike" cap="none" normalizeH="0" baseline="0" dirty="0">
+                <a:ln>
+                  <a:noFill/>
+                </a:ln>
+                <a:solidFill>
+                  <a:schemeClr val="tx1"/>
+                </a:solidFill>
+                <a:effectLst/>
+                <a:hlinkClick r:id="rId3"/>
+              </a:rPr>
+              <a:t>https://www.fao.org/soils-portal</a:t>
+            </a:r>
+            <a:endParaRPr kumimoji="0" lang="en-US" altLang="en-US" b="0" i="0" u="none" strike="noStrike" cap="none" normalizeH="0" baseline="0" dirty="0">
+              <a:ln>
+                <a:noFill/>
+              </a:ln>
+              <a:solidFill>
+                <a:schemeClr val="tx1"/>
+              </a:solidFill>
+              <a:effectLst/>
+            </a:endParaRPr>
+          </a:p>
+          <a:p>
+            <a:pPr marL="0" marR="0" lvl="0" indent="0" algn="l" defTabSz="914400" rtl="0" eaLnBrk="0" fontAlgn="base" latinLnBrk="0" hangingPunct="0">
+              <a:lnSpc>
+                <a:spcPct val="100000"/>
+              </a:lnSpc>
+              <a:spcBef>
+                <a:spcPct val="0"/>
+              </a:spcBef>
+              <a:spcAft>
+                <a:spcPct val="0"/>
+              </a:spcAft>
+              <a:buClrTx/>
+              <a:buSzTx/>
+              <a:buNone/>
+              <a:tabLst/>
+            </a:pPr>
+            <a:r>
+              <a:rPr kumimoji="0" lang="en-US" altLang="en-US" b="0" i="0" u="none" strike="noStrike" cap="none" normalizeH="0" baseline="0" dirty="0">
+                <a:ln>
+                  <a:noFill/>
+                </a:ln>
+                <a:solidFill>
+                  <a:schemeClr val="tx1"/>
+                </a:solidFill>
+                <a:effectLst/>
+              </a:rPr>
+              <a:t>[3] </a:t>
+            </a:r>
+            <a:r>
+              <a:rPr kumimoji="0" lang="en-US" altLang="en-US" b="0" i="0" u="none" strike="noStrike" cap="none" normalizeH="0" baseline="0" noProof="1">
+                <a:ln>
+                  <a:noFill/>
+                </a:ln>
+                <a:solidFill>
+                  <a:schemeClr val="tx1"/>
+                </a:solidFill>
+                <a:effectLst/>
+              </a:rPr>
+              <a:t>Breiman</a:t>
+            </a:r>
+            <a:r>
+              <a:rPr kumimoji="0" lang="en-US" altLang="en-US" b="0" i="0" u="none" strike="noStrike" cap="none" normalizeH="0" baseline="0" dirty="0">
+                <a:ln>
+                  <a:noFill/>
+                </a:ln>
+                <a:solidFill>
+                  <a:schemeClr val="tx1"/>
+                </a:solidFill>
+                <a:effectLst/>
+              </a:rPr>
+              <a:t>, L. (2001). Random Forests. Machine Learning.</a:t>
+            </a:r>
+          </a:p>
+          <a:p>
+            <a:pPr marL="0" marR="0" lvl="0" indent="0" algn="l" defTabSz="914400" rtl="0" eaLnBrk="0" fontAlgn="base" latinLnBrk="0" hangingPunct="0">
+              <a:lnSpc>
+                <a:spcPct val="100000"/>
+              </a:lnSpc>
+              <a:spcBef>
+                <a:spcPct val="0"/>
+              </a:spcBef>
+              <a:spcAft>
+                <a:spcPct val="0"/>
+              </a:spcAft>
+              <a:buClrTx/>
+              <a:buSzTx/>
+              <a:buNone/>
+              <a:tabLst/>
+            </a:pPr>
+            <a:r>
+              <a:rPr kumimoji="0" lang="en-US" altLang="en-US" b="0" i="0" u="none" strike="noStrike" cap="none" normalizeH="0" baseline="0" dirty="0">
+                <a:ln>
+                  <a:noFill/>
+                </a:ln>
+                <a:solidFill>
+                  <a:schemeClr val="tx1"/>
+                </a:solidFill>
+                <a:effectLst/>
+              </a:rPr>
+              <a:t>[4] </a:t>
+            </a:r>
+            <a:r>
+              <a:rPr kumimoji="0" lang="en-US" altLang="en-US" b="0" i="0" u="none" strike="noStrike" cap="none" normalizeH="0" baseline="0" noProof="1">
+                <a:ln>
+                  <a:noFill/>
+                </a:ln>
+                <a:solidFill>
+                  <a:schemeClr val="tx1"/>
+                </a:solidFill>
+                <a:effectLst/>
+              </a:rPr>
+              <a:t>XGBoost</a:t>
+            </a:r>
+            <a:r>
+              <a:rPr kumimoji="0" lang="en-US" altLang="en-US" b="0" i="0" u="none" strike="noStrike" cap="none" normalizeH="0" baseline="0" dirty="0">
+                <a:ln>
+                  <a:noFill/>
+                </a:ln>
+                <a:solidFill>
+                  <a:schemeClr val="tx1"/>
+                </a:solidFill>
+                <a:effectLst/>
+              </a:rPr>
+              <a:t> Documentation. </a:t>
+            </a:r>
+            <a:r>
+              <a:rPr kumimoji="0" lang="en-US" altLang="en-US" b="0" i="0" u="none" strike="noStrike" cap="none" normalizeH="0" baseline="0" dirty="0">
+                <a:ln>
+                  <a:noFill/>
+                </a:ln>
+                <a:solidFill>
+                  <a:schemeClr val="tx1"/>
+                </a:solidFill>
+                <a:effectLst/>
+                <a:hlinkClick r:id="rId4"/>
+              </a:rPr>
+              <a:t>https://xgboost.readthedocs.io/</a:t>
+            </a:r>
+            <a:endParaRPr kumimoji="0" lang="en-US" altLang="en-US" b="0" i="0" u="none" strike="noStrike" cap="none" normalizeH="0" baseline="0" dirty="0">
+              <a:ln>
+                <a:noFill/>
+              </a:ln>
+              <a:solidFill>
+                <a:schemeClr val="tx1"/>
+              </a:solidFill>
+              <a:effectLst/>
+            </a:endParaRPr>
+          </a:p>
+          <a:p>
+            <a:pPr marL="0" marR="0" lvl="0" indent="0" algn="l" defTabSz="914400" rtl="0" eaLnBrk="0" fontAlgn="base" latinLnBrk="0" hangingPunct="0">
+              <a:lnSpc>
+                <a:spcPct val="100000"/>
+              </a:lnSpc>
+              <a:spcBef>
+                <a:spcPct val="0"/>
+              </a:spcBef>
+              <a:spcAft>
+                <a:spcPct val="0"/>
+              </a:spcAft>
+              <a:buClrTx/>
+              <a:buSzTx/>
+              <a:buNone/>
+              <a:tabLst/>
+            </a:pPr>
+            <a:r>
+              <a:rPr kumimoji="0" lang="en-US" altLang="en-US" b="0" i="0" u="none" strike="noStrike" cap="none" normalizeH="0" baseline="0" dirty="0">
+                <a:ln>
+                  <a:noFill/>
+                </a:ln>
+                <a:solidFill>
+                  <a:schemeClr val="tx1"/>
+                </a:solidFill>
+                <a:effectLst/>
+              </a:rPr>
+              <a:t>[5] Sentinel-2 Data Hub. https://scihub.copernicus.eu/</a:t>
+            </a:r>
+            <a:br>
+              <a:rPr kumimoji="0" lang="en-US" altLang="en-US" b="0" i="0" u="none" strike="noStrike" cap="none" normalizeH="0" baseline="0" dirty="0">
+                <a:ln>
+                  <a:noFill/>
+                </a:ln>
+                <a:solidFill>
+                  <a:schemeClr val="tx1"/>
+                </a:solidFill>
+                <a:effectLst/>
+              </a:rPr>
+            </a:br>
+            <a:r>
+              <a:rPr kumimoji="0" lang="en-US" altLang="en-US" b="0" i="0" u="none" strike="noStrike" cap="none" normalizeH="0" baseline="0" dirty="0">
+                <a:ln>
+                  <a:noFill/>
+                </a:ln>
+                <a:solidFill>
+                  <a:schemeClr val="tx1"/>
+                </a:solidFill>
+                <a:effectLst/>
+              </a:rPr>
+              <a:t>(</a:t>
+            </a:r>
+            <a:r>
+              <a:rPr kumimoji="0" lang="en-US" altLang="en-US" b="0" i="1" u="none" strike="noStrike" cap="none" normalizeH="0" baseline="0" dirty="0">
+                <a:ln>
+                  <a:noFill/>
+                </a:ln>
+                <a:solidFill>
+                  <a:schemeClr val="tx1"/>
+                </a:solidFill>
+                <a:effectLst/>
+              </a:rPr>
+              <a:t>Add all relevant sources used</a:t>
+            </a:r>
+            <a:r>
+              <a:rPr kumimoji="0" lang="en-US" altLang="en-US" b="0" i="0" u="none" strike="noStrike" cap="none" normalizeH="0" baseline="0" dirty="0">
+                <a:ln>
+                  <a:noFill/>
+                </a:ln>
+                <a:solidFill>
+                  <a:schemeClr val="tx1"/>
+                </a:solidFill>
+                <a:effectLst/>
+              </a:rPr>
+              <a:t>)</a:t>
+            </a:r>
+            <a:endParaRPr kumimoji="0" lang="tr-TR" altLang="en-US" b="0" i="0" u="none" strike="noStrike" cap="none" normalizeH="0" baseline="0" dirty="0">
+              <a:ln>
+                <a:noFill/>
+              </a:ln>
+              <a:solidFill>
+                <a:schemeClr val="tx1"/>
+              </a:solidFill>
+              <a:effectLst/>
+            </a:endParaRPr>
+          </a:p>
+          <a:p>
+            <a:pPr marL="0" marR="0" lvl="0" indent="0" algn="l" defTabSz="914400" rtl="0" eaLnBrk="0" fontAlgn="base" latinLnBrk="0" hangingPunct="0">
+              <a:lnSpc>
+                <a:spcPct val="100000"/>
+              </a:lnSpc>
+              <a:spcBef>
+                <a:spcPct val="0"/>
+              </a:spcBef>
+              <a:spcAft>
+                <a:spcPct val="0"/>
+              </a:spcAft>
+              <a:buClrTx/>
+              <a:buSzTx/>
+              <a:buNone/>
+              <a:tabLst/>
+            </a:pPr>
+            <a:r>
+              <a:rPr kumimoji="0" lang="en-US" altLang="en-US" b="0" i="0" u="none" strike="noStrike" cap="none" normalizeH="0" baseline="0" dirty="0">
+                <a:ln>
+                  <a:noFill/>
+                </a:ln>
+                <a:solidFill>
+                  <a:schemeClr val="tx1"/>
+                </a:solidFill>
+                <a:effectLst/>
+              </a:rPr>
+              <a:t>[</a:t>
+            </a:r>
+            <a:r>
+              <a:rPr kumimoji="0" lang="tr-TR" altLang="en-US" b="0" i="0" u="none" strike="noStrike" cap="none" normalizeH="0" baseline="0" dirty="0">
+                <a:ln>
+                  <a:noFill/>
+                </a:ln>
+                <a:solidFill>
+                  <a:schemeClr val="tx1"/>
+                </a:solidFill>
+                <a:effectLst/>
+              </a:rPr>
+              <a:t>6</a:t>
+            </a:r>
+            <a:r>
+              <a:rPr kumimoji="0" lang="en-US" altLang="en-US" b="0" i="0" u="none" strike="noStrike" cap="none" normalizeH="0" baseline="0" dirty="0">
+                <a:ln>
+                  <a:noFill/>
+                </a:ln>
+                <a:solidFill>
+                  <a:schemeClr val="tx1"/>
+                </a:solidFill>
+                <a:effectLst/>
+              </a:rPr>
+              <a:t>]</a:t>
+            </a:r>
+            <a:r>
+              <a:rPr kumimoji="0" lang="tr-TR" altLang="en-US" b="0" i="0" u="none" strike="noStrike" cap="none" normalizeH="0" baseline="0" dirty="0">
+                <a:ln>
+                  <a:noFill/>
+                </a:ln>
+                <a:solidFill>
+                  <a:schemeClr val="tx1"/>
+                </a:solidFill>
+                <a:effectLst/>
+              </a:rPr>
+              <a:t> </a:t>
+            </a:r>
+            <a:r>
+              <a:rPr lang="en-CA" dirty="0"/>
+              <a:t>Random Forest, </a:t>
+            </a:r>
+            <a:r>
+              <a:rPr lang="en-CA" noProof="1"/>
+              <a:t>LightGBM</a:t>
+            </a:r>
+            <a:r>
+              <a:rPr lang="en-CA" dirty="0"/>
+              <a:t> documentation.</a:t>
+            </a:r>
+            <a:endParaRPr lang="tr-TR" dirty="0"/>
+          </a:p>
+          <a:p>
+            <a:pPr marL="0" marR="0" lvl="0" indent="0" algn="l" defTabSz="914400" rtl="0" eaLnBrk="0" fontAlgn="base" latinLnBrk="0" hangingPunct="0">
+              <a:lnSpc>
+                <a:spcPct val="100000"/>
+              </a:lnSpc>
+              <a:spcBef>
+                <a:spcPct val="0"/>
+              </a:spcBef>
+              <a:spcAft>
+                <a:spcPct val="0"/>
+              </a:spcAft>
+              <a:buClrTx/>
+              <a:buSzTx/>
+              <a:buNone/>
+              <a:tabLst/>
+            </a:pPr>
+            <a:r>
+              <a:rPr kumimoji="0" lang="en-US" altLang="en-US" b="0" i="0" u="none" strike="noStrike" cap="none" normalizeH="0" baseline="0" dirty="0">
+                <a:ln>
+                  <a:noFill/>
+                </a:ln>
+                <a:solidFill>
+                  <a:schemeClr val="tx1"/>
+                </a:solidFill>
+                <a:effectLst/>
+              </a:rPr>
+              <a:t>[</a:t>
+            </a:r>
+            <a:r>
+              <a:rPr kumimoji="0" lang="tr-TR" altLang="en-US" b="0" i="0" u="none" strike="noStrike" cap="none" normalizeH="0" baseline="0" dirty="0">
+                <a:ln>
+                  <a:noFill/>
+                </a:ln>
+                <a:solidFill>
+                  <a:schemeClr val="tx1"/>
+                </a:solidFill>
+                <a:effectLst/>
+              </a:rPr>
+              <a:t>7</a:t>
+            </a:r>
+            <a:r>
+              <a:rPr kumimoji="0" lang="en-US" altLang="en-US" b="0" i="0" u="none" strike="noStrike" cap="none" normalizeH="0" baseline="0" dirty="0">
+                <a:ln>
+                  <a:noFill/>
+                </a:ln>
+                <a:solidFill>
+                  <a:schemeClr val="tx1"/>
+                </a:solidFill>
+                <a:effectLst/>
+              </a:rPr>
+              <a:t>] </a:t>
+            </a:r>
+            <a:r>
+              <a:rPr lang="en-CA" dirty="0"/>
+              <a:t>Sentinel-2 and MODIS Data Catalog.</a:t>
+            </a:r>
+            <a:endParaRPr lang="tr-TR" dirty="0"/>
+          </a:p>
+          <a:p>
+            <a:pPr marL="0" marR="0" lvl="0" indent="0" algn="l" defTabSz="914400" rtl="0" eaLnBrk="0" fontAlgn="base" latinLnBrk="0" hangingPunct="0">
+              <a:lnSpc>
+                <a:spcPct val="100000"/>
+              </a:lnSpc>
+              <a:spcBef>
+                <a:spcPct val="0"/>
+              </a:spcBef>
+              <a:spcAft>
+                <a:spcPct val="0"/>
+              </a:spcAft>
+              <a:buClrTx/>
+              <a:buSzTx/>
+              <a:buNone/>
+              <a:tabLst/>
+            </a:pPr>
+            <a:r>
+              <a:rPr kumimoji="0" lang="en-US" altLang="en-US" b="0" i="0" u="none" strike="noStrike" cap="none" normalizeH="0" baseline="0" dirty="0">
+                <a:ln>
+                  <a:noFill/>
+                </a:ln>
+                <a:solidFill>
+                  <a:schemeClr val="tx1"/>
+                </a:solidFill>
+                <a:effectLst/>
+              </a:rPr>
+              <a:t>[</a:t>
+            </a:r>
+            <a:r>
+              <a:rPr kumimoji="0" lang="tr-TR" altLang="en-US" b="0" i="0" u="none" strike="noStrike" cap="none" normalizeH="0" baseline="0" dirty="0">
+                <a:ln>
+                  <a:noFill/>
+                </a:ln>
+                <a:solidFill>
+                  <a:schemeClr val="tx1"/>
+                </a:solidFill>
+                <a:effectLst/>
+              </a:rPr>
+              <a:t>8</a:t>
+            </a:r>
+            <a:r>
+              <a:rPr kumimoji="0" lang="en-US" altLang="en-US" b="0" i="0" u="none" strike="noStrike" cap="none" normalizeH="0" baseline="0" dirty="0">
+                <a:ln>
+                  <a:noFill/>
+                </a:ln>
+                <a:solidFill>
+                  <a:schemeClr val="tx1"/>
+                </a:solidFill>
+                <a:effectLst/>
+              </a:rPr>
+              <a:t>] </a:t>
+            </a:r>
+            <a:r>
+              <a:rPr lang="en-CA" dirty="0"/>
+              <a:t>ISRIC </a:t>
+            </a:r>
+            <a:r>
+              <a:rPr lang="en-CA" noProof="1"/>
+              <a:t>SoilGrids</a:t>
+            </a:r>
+            <a:endParaRPr kumimoji="0" lang="en-CA" altLang="en-US" b="0" i="0" u="none" strike="noStrike" cap="none" normalizeH="0" baseline="0" noProof="1">
+              <a:ln>
+                <a:noFill/>
+              </a:ln>
+              <a:solidFill>
+                <a:schemeClr val="tx1"/>
+              </a:solidFill>
+              <a:effectLst/>
+            </a:endParaRPr>
+          </a:p>
+        </p:txBody>
+      </p:sp>
+    </p:spTree>
+    <p:extLst>
+      <p:ext uri="{BB962C8B-B14F-4D97-AF65-F5344CB8AC3E}">
+        <p14:creationId xmlns:p14="http://schemas.microsoft.com/office/powerpoint/2010/main" val="3664326242"/>
       </p:ext>
     </p:extLst>
   </p:cSld>

</xml_diff>